<commit_message>
ppt update until build and deployment
</commit_message>
<xml_diff>
--- a/스프링 게시판 만들기_240821.pptx
+++ b/스프링 게시판 만들기_240821.pptx
@@ -11,18 +11,21 @@
     <p:sldId id="270" r:id="rId5"/>
     <p:sldId id="272" r:id="rId6"/>
     <p:sldId id="273" r:id="rId7"/>
-    <p:sldId id="257" r:id="rId8"/>
-    <p:sldId id="259" r:id="rId9"/>
-    <p:sldId id="260" r:id="rId10"/>
-    <p:sldId id="261" r:id="rId11"/>
-    <p:sldId id="262" r:id="rId12"/>
-    <p:sldId id="263" r:id="rId13"/>
-    <p:sldId id="264" r:id="rId14"/>
-    <p:sldId id="265" r:id="rId15"/>
-    <p:sldId id="266" r:id="rId16"/>
-    <p:sldId id="267" r:id="rId17"/>
-    <p:sldId id="268" r:id="rId18"/>
-    <p:sldId id="269" r:id="rId19"/>
+    <p:sldId id="274" r:id="rId8"/>
+    <p:sldId id="257" r:id="rId9"/>
+    <p:sldId id="259" r:id="rId10"/>
+    <p:sldId id="260" r:id="rId11"/>
+    <p:sldId id="261" r:id="rId12"/>
+    <p:sldId id="262" r:id="rId13"/>
+    <p:sldId id="263" r:id="rId14"/>
+    <p:sldId id="264" r:id="rId15"/>
+    <p:sldId id="265" r:id="rId16"/>
+    <p:sldId id="266" r:id="rId17"/>
+    <p:sldId id="267" r:id="rId18"/>
+    <p:sldId id="268" r:id="rId19"/>
+    <p:sldId id="269" r:id="rId20"/>
+    <p:sldId id="276" r:id="rId21"/>
+    <p:sldId id="275" r:id="rId22"/>
   </p:sldIdLst>
   <p:sldSz cx="12192000" cy="6858000"/>
   <p:notesSz cx="6858000" cy="9144000"/>
@@ -3431,6 +3434,431 @@
           <p:cNvPr id="2" name="제목 1">
             <a:extLst>
               <a:ext uri="{FF2B5EF4-FFF2-40B4-BE49-F238E27FC236}">
+                <a16:creationId xmlns:a16="http://schemas.microsoft.com/office/drawing/2014/main" id="{C7A70ABB-1CBE-FBBF-E74C-E3DBD3EE4EB6}"/>
+              </a:ext>
+            </a:extLst>
+          </p:cNvPr>
+          <p:cNvSpPr>
+            <a:spLocks noGrp="1"/>
+          </p:cNvSpPr>
+          <p:nvPr>
+            <p:ph type="title"/>
+          </p:nvPr>
+        </p:nvSpPr>
+        <p:spPr/>
+        <p:txBody>
+          <a:bodyPr/>
+          <a:lstStyle/>
+          <a:p>
+            <a:r>
+              <a:rPr lang="en-US" altLang="ko-KR" sz="3000" dirty="0"/>
+              <a:t>Controller</a:t>
+            </a:r>
+            <a:r>
+              <a:rPr lang="en-US" altLang="ko-KR" sz="2000" dirty="0"/>
+              <a:t>(</a:t>
+            </a:r>
+            <a:r>
+              <a:rPr lang="en-US" altLang="ko-KR" sz="2000" dirty="0" err="1"/>
+              <a:t>UserController</a:t>
+            </a:r>
+            <a:r>
+              <a:rPr lang="en-US" altLang="ko-KR" sz="2000" dirty="0"/>
+              <a:t>)</a:t>
+            </a:r>
+            <a:endParaRPr lang="ko-KR" altLang="en-US" sz="2000" dirty="0"/>
+          </a:p>
+        </p:txBody>
+      </p:sp>
+      <p:sp>
+        <p:nvSpPr>
+          <p:cNvPr id="3" name="내용 개체 틀 2">
+            <a:extLst>
+              <a:ext uri="{FF2B5EF4-FFF2-40B4-BE49-F238E27FC236}">
+                <a16:creationId xmlns:a16="http://schemas.microsoft.com/office/drawing/2014/main" id="{DEA9CDA8-0219-529B-A333-4B9479A92801}"/>
+              </a:ext>
+            </a:extLst>
+          </p:cNvPr>
+          <p:cNvSpPr>
+            <a:spLocks noGrp="1"/>
+          </p:cNvSpPr>
+          <p:nvPr>
+            <p:ph idx="1"/>
+          </p:nvPr>
+        </p:nvSpPr>
+        <p:spPr>
+          <a:xfrm>
+            <a:off x="838200" y="3525625"/>
+            <a:ext cx="10515600" cy="2651338"/>
+          </a:xfrm>
+        </p:spPr>
+        <p:txBody>
+          <a:bodyPr>
+            <a:normAutofit/>
+          </a:bodyPr>
+          <a:lstStyle/>
+          <a:p>
+            <a:r>
+              <a:rPr lang="en-US" altLang="ko-KR" sz="2000" dirty="0" err="1"/>
+              <a:t>PostMapping</a:t>
+            </a:r>
+            <a:endParaRPr lang="en-US" altLang="ko-KR" sz="2000" dirty="0"/>
+          </a:p>
+          <a:p>
+            <a:pPr marL="0" indent="0">
+              <a:buNone/>
+            </a:pPr>
+            <a:r>
+              <a:rPr lang="en-US" altLang="ko-KR" sz="1500" dirty="0" err="1"/>
+              <a:t>changePassword.jsp</a:t>
+            </a:r>
+            <a:r>
+              <a:rPr lang="ko-KR" altLang="en-US" sz="1500" dirty="0"/>
+              <a:t> 화면에서 사용자의 </a:t>
+            </a:r>
+            <a:r>
+              <a:rPr lang="en-US" altLang="ko-KR" sz="1500" dirty="0"/>
+              <a:t>Post </a:t>
+            </a:r>
+            <a:r>
+              <a:rPr lang="ko-KR" altLang="en-US" sz="1500" dirty="0"/>
+              <a:t>요청을 </a:t>
+            </a:r>
+            <a:r>
+              <a:rPr lang="en-US" altLang="ko-KR" sz="1500" dirty="0" err="1"/>
+              <a:t>changePassword</a:t>
+            </a:r>
+            <a:r>
+              <a:rPr lang="en-US" altLang="ko-KR" sz="1500" dirty="0"/>
+              <a:t> </a:t>
+            </a:r>
+            <a:r>
+              <a:rPr lang="ko-KR" altLang="en-US" sz="1500" dirty="0"/>
+              <a:t>메소드로 </a:t>
+            </a:r>
+            <a:r>
+              <a:rPr lang="ko-KR" altLang="en-US" sz="1500" dirty="0" err="1"/>
+              <a:t>매핑시킨다</a:t>
+            </a:r>
+            <a:r>
+              <a:rPr lang="en-US" altLang="ko-KR" sz="1500" dirty="0"/>
+              <a:t>.</a:t>
+            </a:r>
+          </a:p>
+          <a:p>
+            <a:pPr marL="0" indent="0">
+              <a:buNone/>
+            </a:pPr>
+            <a:r>
+              <a:rPr lang="en-US" altLang="ko-KR" sz="1500" dirty="0"/>
+              <a:t>@RequestParam: Request Body</a:t>
+            </a:r>
+            <a:r>
+              <a:rPr lang="ko-KR" altLang="en-US" sz="1500" dirty="0"/>
+              <a:t>에 있는 데이터를 </a:t>
+            </a:r>
+            <a:r>
+              <a:rPr lang="en-US" altLang="ko-KR" sz="1500" dirty="0"/>
+              <a:t>key</a:t>
+            </a:r>
+            <a:r>
+              <a:rPr lang="ko-KR" altLang="en-US" sz="1500" dirty="0"/>
+              <a:t>값을 통해서 받아들인다</a:t>
+            </a:r>
+            <a:r>
+              <a:rPr lang="en-US" altLang="ko-KR" sz="1500" dirty="0"/>
+              <a:t>.</a:t>
+            </a:r>
+            <a:endParaRPr lang="en-US" altLang="ko-KR" sz="2000" dirty="0"/>
+          </a:p>
+          <a:p>
+            <a:pPr marL="0" indent="0">
+              <a:buNone/>
+            </a:pPr>
+            <a:r>
+              <a:rPr lang="en-US" altLang="ko-KR" sz="1500" dirty="0" err="1"/>
+              <a:t>userService</a:t>
+            </a:r>
+            <a:r>
+              <a:rPr lang="ko-KR" altLang="en-US" sz="1500" dirty="0"/>
+              <a:t>의 </a:t>
+            </a:r>
+            <a:r>
+              <a:rPr lang="en-US" altLang="ko-KR" sz="1500" dirty="0" err="1"/>
+              <a:t>changePassword</a:t>
+            </a:r>
+            <a:r>
+              <a:rPr lang="ko-KR" altLang="en-US" sz="1500" dirty="0"/>
+              <a:t>메소드를 수행하고</a:t>
+            </a:r>
+            <a:r>
+              <a:rPr lang="en-US" altLang="ko-KR" sz="1500" dirty="0"/>
+              <a:t>, </a:t>
+            </a:r>
+            <a:r>
+              <a:rPr lang="en-US" altLang="ko-KR" sz="1500" dirty="0" err="1"/>
+              <a:t>boolean</a:t>
+            </a:r>
+            <a:r>
+              <a:rPr lang="en-US" altLang="ko-KR" sz="1500" dirty="0"/>
+              <a:t> </a:t>
+            </a:r>
+            <a:r>
+              <a:rPr lang="ko-KR" altLang="en-US" sz="1500" dirty="0"/>
+              <a:t>형태의 </a:t>
+            </a:r>
+            <a:r>
+              <a:rPr lang="en-US" altLang="ko-KR" sz="1500" dirty="0"/>
+              <a:t>return</a:t>
+            </a:r>
+            <a:r>
+              <a:rPr lang="ko-KR" altLang="en-US" sz="1500" dirty="0"/>
+              <a:t>값을 </a:t>
+            </a:r>
+            <a:r>
+              <a:rPr lang="en-US" altLang="ko-KR" sz="1500" dirty="0"/>
+              <a:t>changed</a:t>
+            </a:r>
+            <a:r>
+              <a:rPr lang="ko-KR" altLang="en-US" sz="1500" dirty="0"/>
+              <a:t>에 저장한다</a:t>
+            </a:r>
+            <a:r>
+              <a:rPr lang="en-US" altLang="ko-KR" sz="1500" dirty="0"/>
+              <a:t>.</a:t>
+            </a:r>
+          </a:p>
+          <a:p>
+            <a:pPr marL="0" indent="0">
+              <a:buNone/>
+            </a:pPr>
+            <a:r>
+              <a:rPr lang="ko-KR" altLang="en-US" sz="1500" dirty="0"/>
+              <a:t>만약</a:t>
+            </a:r>
+            <a:r>
+              <a:rPr lang="en-US" altLang="ko-KR" sz="1500" dirty="0"/>
+              <a:t>, Password</a:t>
+            </a:r>
+            <a:r>
+              <a:rPr lang="ko-KR" altLang="en-US" sz="1500" dirty="0"/>
+              <a:t>가 </a:t>
+            </a:r>
+            <a:r>
+              <a:rPr lang="ko-KR" altLang="en-US" sz="1500" dirty="0" err="1"/>
+              <a:t>변경됬으면</a:t>
+            </a:r>
+            <a:r>
+              <a:rPr lang="en-US" altLang="ko-KR" sz="1500" dirty="0"/>
+              <a:t>, user/login </a:t>
+            </a:r>
+            <a:r>
+              <a:rPr lang="en-US" altLang="ko-KR" sz="1500" dirty="0" err="1"/>
+              <a:t>url</a:t>
+            </a:r>
+            <a:r>
+              <a:rPr lang="ko-KR" altLang="en-US" sz="1500" dirty="0"/>
+              <a:t>로 </a:t>
+            </a:r>
+            <a:r>
+              <a:rPr lang="en-US" altLang="ko-KR" sz="1500" dirty="0"/>
+              <a:t>get </a:t>
+            </a:r>
+            <a:r>
+              <a:rPr lang="ko-KR" altLang="en-US" sz="1500" dirty="0"/>
+              <a:t>요청을 보낸다</a:t>
+            </a:r>
+            <a:r>
+              <a:rPr lang="en-US" altLang="ko-KR" sz="1500" dirty="0"/>
+              <a:t>. </a:t>
+            </a:r>
+            <a:r>
+              <a:rPr lang="ko-KR" altLang="en-US" sz="1500" dirty="0"/>
+              <a:t>그러면 앞에서 본 </a:t>
+            </a:r>
+            <a:r>
+              <a:rPr lang="en-US" altLang="ko-KR" sz="1500" dirty="0" err="1"/>
+              <a:t>url</a:t>
+            </a:r>
+            <a:r>
+              <a:rPr lang="ko-KR" altLang="en-US" sz="1500" dirty="0"/>
+              <a:t>에 </a:t>
+            </a:r>
+            <a:r>
+              <a:rPr lang="ko-KR" altLang="en-US" sz="1500" dirty="0" err="1"/>
+              <a:t>매핑된</a:t>
+            </a:r>
+            <a:r>
+              <a:rPr lang="ko-KR" altLang="en-US" sz="1500" dirty="0"/>
+              <a:t> 메소드가 실행되고</a:t>
+            </a:r>
+            <a:r>
+              <a:rPr lang="en-US" altLang="ko-KR" sz="1500" dirty="0"/>
+              <a:t>, </a:t>
+            </a:r>
+            <a:r>
+              <a:rPr lang="en-US" altLang="ko-KR" sz="1500" dirty="0" err="1"/>
+              <a:t>login.jsp</a:t>
+            </a:r>
+            <a:r>
+              <a:rPr lang="ko-KR" altLang="en-US" sz="1500" dirty="0"/>
+              <a:t>가 사용자에게 보여지게 된다</a:t>
+            </a:r>
+            <a:r>
+              <a:rPr lang="en-US" altLang="ko-KR" sz="1500" dirty="0"/>
+              <a:t>.</a:t>
+            </a:r>
+          </a:p>
+          <a:p>
+            <a:pPr marL="0" indent="0">
+              <a:buNone/>
+            </a:pPr>
+            <a:r>
+              <a:rPr lang="en-US" altLang="ko-KR" sz="1500" dirty="0"/>
+              <a:t>Model: </a:t>
+            </a:r>
+            <a:r>
+              <a:rPr lang="ko-KR" altLang="en-US" sz="1500" dirty="0"/>
+              <a:t>모델은 데이터를 </a:t>
+            </a:r>
+            <a:r>
+              <a:rPr lang="en-US" altLang="ko-KR" sz="1500" dirty="0"/>
+              <a:t>view</a:t>
+            </a:r>
+            <a:r>
+              <a:rPr lang="ko-KR" altLang="en-US" sz="1500" dirty="0"/>
+              <a:t>로 보내는 것을 허용한다</a:t>
+            </a:r>
+            <a:r>
+              <a:rPr lang="en-US" altLang="ko-KR" sz="1500" dirty="0"/>
+              <a:t>. (</a:t>
+            </a:r>
+            <a:r>
+              <a:rPr lang="ko-KR" altLang="en-US" sz="1500" dirty="0"/>
+              <a:t>여기서는 </a:t>
+            </a:r>
+            <a:r>
+              <a:rPr lang="en-US" altLang="ko-KR" sz="1500" dirty="0"/>
+              <a:t>model</a:t>
+            </a:r>
+            <a:r>
+              <a:rPr lang="ko-KR" altLang="en-US" sz="1500" dirty="0"/>
+              <a:t>에 </a:t>
+            </a:r>
+            <a:r>
+              <a:rPr lang="en-US" altLang="ko-KR" sz="1500" dirty="0"/>
+              <a:t>key “error”, value “</a:t>
+            </a:r>
+            <a:r>
+              <a:rPr lang="ko-KR" altLang="en-US" sz="1500" dirty="0"/>
+              <a:t>패스워드를 바꾸는데 실패했습니다</a:t>
+            </a:r>
+            <a:r>
+              <a:rPr lang="en-US" altLang="ko-KR" sz="1500" dirty="0"/>
+              <a:t>.”</a:t>
+            </a:r>
+            <a:r>
+              <a:rPr lang="ko-KR" altLang="en-US" sz="1500" dirty="0"/>
+              <a:t>를 등록하고 이 데이터를 </a:t>
+            </a:r>
+            <a:r>
+              <a:rPr lang="en-US" altLang="ko-KR" sz="1500" dirty="0" err="1"/>
+              <a:t>changePassword.jsp</a:t>
+            </a:r>
+            <a:r>
+              <a:rPr lang="ko-KR" altLang="en-US" sz="1500" dirty="0"/>
+              <a:t>로 보낸다</a:t>
+            </a:r>
+            <a:r>
+              <a:rPr lang="en-US" altLang="ko-KR" sz="1500" dirty="0"/>
+              <a:t>.)</a:t>
+            </a:r>
+          </a:p>
+          <a:p>
+            <a:pPr marL="0" indent="0">
+              <a:buNone/>
+            </a:pPr>
+            <a:endParaRPr lang="en-US" altLang="ko-KR" sz="1500" dirty="0"/>
+          </a:p>
+          <a:p>
+            <a:pPr marL="0" indent="0">
+              <a:buNone/>
+            </a:pPr>
+            <a:endParaRPr lang="en-US" altLang="ko-KR" sz="1500" dirty="0"/>
+          </a:p>
+          <a:p>
+            <a:pPr marL="0" indent="0">
+              <a:buNone/>
+            </a:pPr>
+            <a:endParaRPr lang="en-US" altLang="ko-KR" sz="1500" dirty="0"/>
+          </a:p>
+        </p:txBody>
+      </p:sp>
+      <p:pic>
+        <p:nvPicPr>
+          <p:cNvPr id="9" name="그림 8">
+            <a:extLst>
+              <a:ext uri="{FF2B5EF4-FFF2-40B4-BE49-F238E27FC236}">
+                <a16:creationId xmlns:a16="http://schemas.microsoft.com/office/drawing/2014/main" id="{E2FCED0D-B818-8784-48B7-BA465D42A6FB}"/>
+              </a:ext>
+            </a:extLst>
+          </p:cNvPr>
+          <p:cNvPicPr>
+            <a:picLocks noChangeAspect="1"/>
+          </p:cNvPicPr>
+          <p:nvPr/>
+        </p:nvPicPr>
+        <p:blipFill>
+          <a:blip r:embed="rId2"/>
+          <a:stretch>
+            <a:fillRect/>
+          </a:stretch>
+        </p:blipFill>
+        <p:spPr>
+          <a:xfrm>
+            <a:off x="668518" y="1258675"/>
+            <a:ext cx="8029575" cy="2266950"/>
+          </a:xfrm>
+          <a:prstGeom prst="rect">
+            <a:avLst/>
+          </a:prstGeom>
+        </p:spPr>
+      </p:pic>
+    </p:spTree>
+    <p:extLst>
+      <p:ext uri="{BB962C8B-B14F-4D97-AF65-F5344CB8AC3E}">
+        <p14:creationId xmlns:p14="http://schemas.microsoft.com/office/powerpoint/2010/main" val="2502994158"/>
+      </p:ext>
+    </p:extLst>
+  </p:cSld>
+  <p:clrMapOvr>
+    <a:masterClrMapping/>
+  </p:clrMapOvr>
+</p:sld>
+</file>
+
+<file path=ppt/slides/slide11.xml><?xml version="1.0" encoding="utf-8"?>
+<p:sld xmlns:a="http://schemas.openxmlformats.org/drawingml/2006/main" xmlns:r="http://schemas.openxmlformats.org/officeDocument/2006/relationships" xmlns:p="http://schemas.openxmlformats.org/presentationml/2006/main">
+  <p:cSld>
+    <p:spTree>
+      <p:nvGrpSpPr>
+        <p:cNvPr id="1" name=""/>
+        <p:cNvGrpSpPr/>
+        <p:nvPr/>
+      </p:nvGrpSpPr>
+      <p:grpSpPr>
+        <a:xfrm>
+          <a:off x="0" y="0"/>
+          <a:ext cx="0" cy="0"/>
+          <a:chOff x="0" y="0"/>
+          <a:chExt cx="0" cy="0"/>
+        </a:xfrm>
+      </p:grpSpPr>
+      <p:sp>
+        <p:nvSpPr>
+          <p:cNvPr id="2" name="제목 1">
+            <a:extLst>
+              <a:ext uri="{FF2B5EF4-FFF2-40B4-BE49-F238E27FC236}">
                 <a16:creationId xmlns:a16="http://schemas.microsoft.com/office/drawing/2014/main" id="{DE5DE670-98EC-CC4A-377A-0AB9C1ED6038}"/>
               </a:ext>
             </a:extLst>
@@ -3628,7 +4056,7 @@
 </p:sld>
 </file>
 
-<file path=ppt/slides/slide11.xml><?xml version="1.0" encoding="utf-8"?>
+<file path=ppt/slides/slide12.xml><?xml version="1.0" encoding="utf-8"?>
 <p:sld xmlns:a="http://schemas.openxmlformats.org/drawingml/2006/main" xmlns:r="http://schemas.openxmlformats.org/officeDocument/2006/relationships" xmlns:p="http://schemas.openxmlformats.org/presentationml/2006/main">
   <p:cSld>
     <p:spTree>
@@ -4019,7 +4447,7 @@
 </p:sld>
 </file>
 
-<file path=ppt/slides/slide12.xml><?xml version="1.0" encoding="utf-8"?>
+<file path=ppt/slides/slide13.xml><?xml version="1.0" encoding="utf-8"?>
 <p:sld xmlns:a="http://schemas.openxmlformats.org/drawingml/2006/main" xmlns:r="http://schemas.openxmlformats.org/officeDocument/2006/relationships" xmlns:p="http://schemas.openxmlformats.org/presentationml/2006/main">
   <p:cSld>
     <p:spTree>
@@ -4386,7 +4814,7 @@
 </p:sld>
 </file>
 
-<file path=ppt/slides/slide13.xml><?xml version="1.0" encoding="utf-8"?>
+<file path=ppt/slides/slide14.xml><?xml version="1.0" encoding="utf-8"?>
 <p:sld xmlns:a="http://schemas.openxmlformats.org/drawingml/2006/main" xmlns:r="http://schemas.openxmlformats.org/officeDocument/2006/relationships" xmlns:p="http://schemas.openxmlformats.org/presentationml/2006/main">
   <p:cSld>
     <p:spTree>
@@ -4654,7 +5082,23 @@
             </a:r>
             <a:r>
               <a:rPr lang="ko-KR" altLang="en-US" sz="1500" dirty="0"/>
-              <a:t>의 리스트도 </a:t>
+              <a:t>의 </a:t>
+            </a:r>
+            <a:r>
+              <a:rPr lang="en-US" altLang="ko-KR" sz="1500" dirty="0"/>
+              <a:t>list&lt;</a:t>
+            </a:r>
+            <a:r>
+              <a:rPr lang="en-US" altLang="ko-KR" sz="1500" dirty="0" err="1"/>
+              <a:t>rootComment</a:t>
+            </a:r>
+            <a:r>
+              <a:rPr lang="en-US" altLang="ko-KR" sz="1500" dirty="0"/>
+              <a:t>&gt;</a:t>
+            </a:r>
+            <a:r>
+              <a:rPr lang="ko-KR" altLang="en-US" sz="1500" dirty="0"/>
+              <a:t>도 </a:t>
             </a:r>
             <a:r>
               <a:rPr lang="en-US" altLang="ko-KR" sz="1500" dirty="0" err="1"/>
@@ -4753,7 +5197,7 @@
 </p:sld>
 </file>
 
-<file path=ppt/slides/slide14.xml><?xml version="1.0" encoding="utf-8"?>
+<file path=ppt/slides/slide15.xml><?xml version="1.0" encoding="utf-8"?>
 <p:sld xmlns:a="http://schemas.openxmlformats.org/drawingml/2006/main" xmlns:r="http://schemas.openxmlformats.org/officeDocument/2006/relationships" xmlns:p="http://schemas.openxmlformats.org/presentationml/2006/main">
   <p:cSld>
     <p:spTree>
@@ -5076,7 +5520,7 @@
 </p:sld>
 </file>
 
-<file path=ppt/slides/slide15.xml><?xml version="1.0" encoding="utf-8"?>
+<file path=ppt/slides/slide16.xml><?xml version="1.0" encoding="utf-8"?>
 <p:sld xmlns:a="http://schemas.openxmlformats.org/drawingml/2006/main" xmlns:r="http://schemas.openxmlformats.org/officeDocument/2006/relationships" xmlns:p="http://schemas.openxmlformats.org/presentationml/2006/main">
   <p:cSld>
     <p:spTree>
@@ -5547,7 +5991,7 @@
 </p:sld>
 </file>
 
-<file path=ppt/slides/slide16.xml><?xml version="1.0" encoding="utf-8"?>
+<file path=ppt/slides/slide17.xml><?xml version="1.0" encoding="utf-8"?>
 <p:sld xmlns:a="http://schemas.openxmlformats.org/drawingml/2006/main" xmlns:r="http://schemas.openxmlformats.org/officeDocument/2006/relationships" xmlns:p="http://schemas.openxmlformats.org/presentationml/2006/main">
   <p:cSld>
     <p:spTree>
@@ -5878,7 +6322,7 @@
 </p:sld>
 </file>
 
-<file path=ppt/slides/slide17.xml><?xml version="1.0" encoding="utf-8"?>
+<file path=ppt/slides/slide18.xml><?xml version="1.0" encoding="utf-8"?>
 <p:sld xmlns:a="http://schemas.openxmlformats.org/drawingml/2006/main" xmlns:r="http://schemas.openxmlformats.org/officeDocument/2006/relationships" xmlns:p="http://schemas.openxmlformats.org/presentationml/2006/main">
   <p:cSld>
     <p:spTree>
@@ -6256,7 +6700,7 @@
 </p:sld>
 </file>
 
-<file path=ppt/slides/slide18.xml><?xml version="1.0" encoding="utf-8"?>
+<file path=ppt/slides/slide19.xml><?xml version="1.0" encoding="utf-8"?>
 <p:sld xmlns:a="http://schemas.openxmlformats.org/drawingml/2006/main" xmlns:r="http://schemas.openxmlformats.org/officeDocument/2006/relationships" xmlns:p="http://schemas.openxmlformats.org/presentationml/2006/main">
   <p:cSld>
     <p:spTree>
@@ -6820,6 +7264,843 @@
 </p:sld>
 </file>
 
+<file path=ppt/slides/slide20.xml><?xml version="1.0" encoding="utf-8"?>
+<p:sld xmlns:a="http://schemas.openxmlformats.org/drawingml/2006/main" xmlns:r="http://schemas.openxmlformats.org/officeDocument/2006/relationships" xmlns:p="http://schemas.openxmlformats.org/presentationml/2006/main">
+  <p:cSld>
+    <p:spTree>
+      <p:nvGrpSpPr>
+        <p:cNvPr id="1" name=""/>
+        <p:cNvGrpSpPr/>
+        <p:nvPr/>
+      </p:nvGrpSpPr>
+      <p:grpSpPr>
+        <a:xfrm>
+          <a:off x="0" y="0"/>
+          <a:ext cx="0" cy="0"/>
+          <a:chOff x="0" y="0"/>
+          <a:chExt cx="0" cy="0"/>
+        </a:xfrm>
+      </p:grpSpPr>
+      <p:sp>
+        <p:nvSpPr>
+          <p:cNvPr id="2" name="제목 1">
+            <a:extLst>
+              <a:ext uri="{FF2B5EF4-FFF2-40B4-BE49-F238E27FC236}">
+                <a16:creationId xmlns:a16="http://schemas.microsoft.com/office/drawing/2014/main" id="{914E337C-465C-7C68-BC60-19D3D18D42A8}"/>
+              </a:ext>
+            </a:extLst>
+          </p:cNvPr>
+          <p:cNvSpPr>
+            <a:spLocks noGrp="1"/>
+          </p:cNvSpPr>
+          <p:nvPr>
+            <p:ph type="title"/>
+          </p:nvPr>
+        </p:nvSpPr>
+        <p:spPr/>
+        <p:txBody>
+          <a:bodyPr>
+            <a:normAutofit/>
+          </a:bodyPr>
+          <a:lstStyle/>
+          <a:p>
+            <a:r>
+              <a:rPr lang="ko-KR" altLang="en-US" sz="3000" dirty="0"/>
+              <a:t>웹 애플리케이션 동작 원리</a:t>
+            </a:r>
+          </a:p>
+        </p:txBody>
+      </p:sp>
+      <p:sp>
+        <p:nvSpPr>
+          <p:cNvPr id="3" name="내용 개체 틀 2">
+            <a:extLst>
+              <a:ext uri="{FF2B5EF4-FFF2-40B4-BE49-F238E27FC236}">
+                <a16:creationId xmlns:a16="http://schemas.microsoft.com/office/drawing/2014/main" id="{1C340A4F-6E16-2945-20F4-83B22407A749}"/>
+              </a:ext>
+            </a:extLst>
+          </p:cNvPr>
+          <p:cNvSpPr>
+            <a:spLocks noGrp="1"/>
+          </p:cNvSpPr>
+          <p:nvPr>
+            <p:ph idx="1"/>
+          </p:nvPr>
+        </p:nvSpPr>
+        <p:spPr/>
+        <p:txBody>
+          <a:bodyPr>
+            <a:normAutofit/>
+          </a:bodyPr>
+          <a:lstStyle/>
+          <a:p>
+            <a:pPr marL="342900" indent="-342900">
+              <a:buFont typeface="+mj-lt"/>
+              <a:buAutoNum type="arabicPeriod"/>
+            </a:pPr>
+            <a:r>
+              <a:rPr lang="en-US" altLang="ko-KR" sz="1500" dirty="0"/>
+              <a:t>Tomcat </a:t>
+            </a:r>
+            <a:r>
+              <a:rPr lang="ko-KR" altLang="en-US" sz="1500" dirty="0"/>
+              <a:t>초기화 </a:t>
+            </a:r>
+            <a:r>
+              <a:rPr lang="en-US" altLang="ko-KR" sz="1500" dirty="0"/>
+              <a:t>(webapp</a:t>
+            </a:r>
+            <a:r>
+              <a:rPr lang="ko-KR" altLang="en-US" sz="1500" dirty="0"/>
+              <a:t> </a:t>
+            </a:r>
+            <a:r>
+              <a:rPr lang="en-US" altLang="ko-KR" sz="1500" dirty="0"/>
+              <a:t>directory</a:t>
+            </a:r>
+            <a:r>
+              <a:rPr lang="ko-KR" altLang="en-US" sz="1500" dirty="0"/>
+              <a:t>에 있는 웹 애플리케이션을 찾는다</a:t>
+            </a:r>
+            <a:r>
+              <a:rPr lang="en-US" altLang="ko-KR" sz="1500" dirty="0"/>
+              <a:t>.)</a:t>
+            </a:r>
+          </a:p>
+          <a:p>
+            <a:pPr marL="342900" indent="-342900">
+              <a:buFont typeface="+mj-lt"/>
+              <a:buAutoNum type="arabicPeriod"/>
+            </a:pPr>
+            <a:r>
+              <a:rPr lang="en-US" altLang="ko-KR" sz="1500" dirty="0"/>
+              <a:t>Tomcat</a:t>
+            </a:r>
+            <a:r>
+              <a:rPr lang="ko-KR" altLang="en-US" sz="1500" dirty="0"/>
+              <a:t>은 </a:t>
+            </a:r>
+            <a:r>
+              <a:rPr lang="en-US" altLang="ko-KR" sz="1500" dirty="0" err="1"/>
+              <a:t>WebApplicationInitiailizer</a:t>
+            </a:r>
+            <a:r>
+              <a:rPr lang="ko-KR" altLang="en-US" sz="1500" dirty="0"/>
+              <a:t>를 찾는다</a:t>
+            </a:r>
+            <a:r>
+              <a:rPr lang="en-US" altLang="ko-KR" sz="1500" dirty="0"/>
+              <a:t>.</a:t>
+            </a:r>
+          </a:p>
+          <a:p>
+            <a:pPr marL="342900" indent="-342900">
+              <a:buFont typeface="+mj-lt"/>
+              <a:buAutoNum type="arabicPeriod"/>
+            </a:pPr>
+            <a:r>
+              <a:rPr lang="en-US" altLang="ko-KR" sz="1500" dirty="0" err="1"/>
+              <a:t>WebApplicationInitializer</a:t>
+            </a:r>
+            <a:r>
+              <a:rPr lang="ko-KR" altLang="en-US" sz="1500" dirty="0"/>
+              <a:t>가 스프링 환경을 세팅한다</a:t>
+            </a:r>
+            <a:r>
+              <a:rPr lang="en-US" altLang="ko-KR" sz="1500" dirty="0"/>
+              <a:t>. (</a:t>
+            </a:r>
+            <a:r>
+              <a:rPr lang="en-US" altLang="ko-KR" sz="1500" dirty="0" err="1"/>
+              <a:t>ApplicationContext</a:t>
+            </a:r>
+            <a:r>
+              <a:rPr lang="ko-KR" altLang="en-US" sz="1500" dirty="0"/>
+              <a:t>를 만든다</a:t>
+            </a:r>
+            <a:r>
+              <a:rPr lang="en-US" altLang="ko-KR" sz="1500" dirty="0"/>
+              <a:t>.)</a:t>
+            </a:r>
+          </a:p>
+          <a:p>
+            <a:pPr marL="342900" indent="-342900">
+              <a:buFont typeface="+mj-lt"/>
+              <a:buAutoNum type="arabicPeriod"/>
+            </a:pPr>
+            <a:r>
+              <a:rPr lang="en-US" altLang="ko-KR" sz="1500" dirty="0" err="1"/>
+              <a:t>WebAppInitializer</a:t>
+            </a:r>
+            <a:r>
+              <a:rPr lang="ko-KR" altLang="en-US" sz="1500" dirty="0"/>
+              <a:t>가 </a:t>
+            </a:r>
+            <a:r>
+              <a:rPr lang="en-US" altLang="ko-KR" sz="1500" dirty="0" err="1"/>
+              <a:t>DispatcherServlet</a:t>
+            </a:r>
+            <a:r>
+              <a:rPr lang="ko-KR" altLang="en-US" sz="1500" dirty="0"/>
+              <a:t>을 만들고 등록한다</a:t>
+            </a:r>
+            <a:r>
+              <a:rPr lang="en-US" altLang="ko-KR" sz="1500" dirty="0"/>
+              <a:t>.</a:t>
+            </a:r>
+          </a:p>
+          <a:p>
+            <a:pPr marL="342900" indent="-342900">
+              <a:buFont typeface="+mj-lt"/>
+              <a:buAutoNum type="arabicPeriod"/>
+            </a:pPr>
+            <a:r>
+              <a:rPr lang="en-US" altLang="ko-KR" sz="1500" dirty="0" err="1"/>
+              <a:t>WebAppInitializer</a:t>
+            </a:r>
+            <a:r>
+              <a:rPr lang="ko-KR" altLang="en-US" sz="1500" dirty="0"/>
+              <a:t>가 </a:t>
+            </a:r>
+            <a:r>
+              <a:rPr lang="en-US" altLang="ko-KR" sz="1500" dirty="0"/>
+              <a:t>Servlet</a:t>
+            </a:r>
+            <a:r>
+              <a:rPr lang="ko-KR" altLang="en-US" sz="1500" dirty="0"/>
+              <a:t>이 설정을 위해 </a:t>
+            </a:r>
+            <a:r>
+              <a:rPr lang="en-US" altLang="ko-KR" sz="1500" dirty="0" err="1"/>
+              <a:t>AppConfig</a:t>
+            </a:r>
+            <a:r>
+              <a:rPr lang="en-US" altLang="ko-KR" sz="1500" dirty="0"/>
+              <a:t> </a:t>
+            </a:r>
+            <a:r>
+              <a:rPr lang="ko-KR" altLang="en-US" sz="1500" dirty="0"/>
+              <a:t>클래스를 사용하도록 구성한다</a:t>
+            </a:r>
+            <a:r>
+              <a:rPr lang="en-US" altLang="ko-KR" sz="1500" dirty="0"/>
+              <a:t>.</a:t>
+            </a:r>
+          </a:p>
+          <a:p>
+            <a:pPr marL="342900" indent="-342900">
+              <a:buFont typeface="+mj-lt"/>
+              <a:buAutoNum type="arabicPeriod"/>
+            </a:pPr>
+            <a:r>
+              <a:rPr lang="ko-KR" altLang="en-US" sz="1500" dirty="0"/>
+              <a:t>스프링이 </a:t>
+            </a:r>
+            <a:r>
+              <a:rPr lang="en-US" altLang="ko-KR" sz="1500" dirty="0" err="1"/>
+              <a:t>ApplicationContext</a:t>
+            </a:r>
+            <a:r>
+              <a:rPr lang="en-US" altLang="ko-KR" sz="1500" dirty="0"/>
+              <a:t> (IoC </a:t>
+            </a:r>
+            <a:r>
+              <a:rPr lang="ko-KR" altLang="en-US" sz="1500" dirty="0"/>
+              <a:t>컨테이너</a:t>
+            </a:r>
+            <a:r>
+              <a:rPr lang="en-US" altLang="ko-KR" sz="1500" dirty="0"/>
+              <a:t>)</a:t>
+            </a:r>
+            <a:r>
+              <a:rPr lang="ko-KR" altLang="en-US" sz="1500" dirty="0"/>
+              <a:t>를 </a:t>
+            </a:r>
+            <a:r>
+              <a:rPr lang="en-US" altLang="ko-KR" sz="1500" dirty="0" err="1"/>
+              <a:t>AppConfig</a:t>
+            </a:r>
+            <a:r>
+              <a:rPr lang="en-US" altLang="ko-KR" sz="1500" dirty="0"/>
+              <a:t> </a:t>
+            </a:r>
+            <a:r>
+              <a:rPr lang="ko-KR" altLang="en-US" sz="1500" dirty="0"/>
+              <a:t>클래스에 근거해서 만든다</a:t>
+            </a:r>
+            <a:r>
+              <a:rPr lang="en-US" altLang="ko-KR" sz="1500" dirty="0"/>
+              <a:t>.</a:t>
+            </a:r>
+          </a:p>
+          <a:p>
+            <a:pPr marL="342900" indent="-342900">
+              <a:buFont typeface="+mj-lt"/>
+              <a:buAutoNum type="arabicPeriod"/>
+            </a:pPr>
+            <a:r>
+              <a:rPr lang="en-US" altLang="ko-KR" sz="1500" dirty="0" err="1"/>
+              <a:t>ApplicationContext</a:t>
+            </a:r>
+            <a:r>
+              <a:rPr lang="ko-KR" altLang="en-US" sz="1500" dirty="0"/>
+              <a:t>가 </a:t>
+            </a:r>
+            <a:r>
+              <a:rPr lang="en-US" altLang="ko-KR" sz="1500" dirty="0"/>
+              <a:t>component</a:t>
+            </a:r>
+            <a:r>
+              <a:rPr lang="ko-KR" altLang="en-US" sz="1500" dirty="0"/>
+              <a:t>를 스캔하고</a:t>
+            </a:r>
+            <a:r>
+              <a:rPr lang="en-US" altLang="ko-KR" sz="1500" dirty="0"/>
+              <a:t>, </a:t>
+            </a:r>
+            <a:r>
+              <a:rPr lang="en-US" altLang="ko-KR" sz="1500" dirty="0" err="1"/>
+              <a:t>AppConig</a:t>
+            </a:r>
+            <a:r>
+              <a:rPr lang="ko-KR" altLang="en-US" sz="1500" dirty="0"/>
+              <a:t>에 정의된 대로 </a:t>
+            </a:r>
+            <a:r>
+              <a:rPr lang="en-US" altLang="ko-KR" sz="1500" dirty="0"/>
+              <a:t>bean</a:t>
+            </a:r>
+            <a:r>
+              <a:rPr lang="ko-KR" altLang="en-US" sz="1500" dirty="0"/>
+              <a:t>을 만든다</a:t>
+            </a:r>
+            <a:r>
+              <a:rPr lang="en-US" altLang="ko-KR" sz="1500" dirty="0"/>
+              <a:t>.</a:t>
+            </a:r>
+          </a:p>
+          <a:p>
+            <a:pPr marL="342900" indent="-342900">
+              <a:buFont typeface="+mj-lt"/>
+              <a:buAutoNum type="arabicPeriod"/>
+            </a:pPr>
+            <a:r>
+              <a:rPr lang="ko-KR" altLang="en-US" sz="1500" dirty="0"/>
+              <a:t>요청이 들어오면</a:t>
+            </a:r>
+            <a:r>
+              <a:rPr lang="en-US" altLang="ko-KR" sz="1500" dirty="0"/>
+              <a:t>, </a:t>
+            </a:r>
+            <a:r>
+              <a:rPr lang="en-US" altLang="ko-KR" sz="1500" dirty="0" err="1"/>
+              <a:t>DispatcherServlet</a:t>
+            </a:r>
+            <a:r>
+              <a:rPr lang="ko-KR" altLang="en-US" sz="1500" dirty="0"/>
+              <a:t>이 받는다</a:t>
+            </a:r>
+            <a:r>
+              <a:rPr lang="en-US" altLang="ko-KR" sz="1500" dirty="0"/>
+              <a:t>. </a:t>
+            </a:r>
+          </a:p>
+          <a:p>
+            <a:pPr marL="342900" indent="-342900">
+              <a:buFont typeface="+mj-lt"/>
+              <a:buAutoNum type="arabicPeriod"/>
+            </a:pPr>
+            <a:r>
+              <a:rPr lang="en-US" altLang="ko-KR" sz="1500" dirty="0"/>
+              <a:t>Servlet</a:t>
+            </a:r>
+            <a:r>
+              <a:rPr lang="ko-KR" altLang="en-US" sz="1500" dirty="0"/>
+              <a:t>은 요청을 처리하기 위해 </a:t>
+            </a:r>
+            <a:r>
+              <a:rPr lang="en-US" altLang="ko-KR" sz="1500" dirty="0" err="1"/>
+              <a:t>ApplicationContext</a:t>
+            </a:r>
+            <a:r>
+              <a:rPr lang="ko-KR" altLang="en-US" sz="1500" dirty="0"/>
+              <a:t>의 </a:t>
+            </a:r>
+            <a:r>
+              <a:rPr lang="en-US" altLang="ko-KR" sz="1500" dirty="0"/>
+              <a:t>bean</a:t>
+            </a:r>
+            <a:r>
+              <a:rPr lang="ko-KR" altLang="en-US" sz="1500" dirty="0"/>
+              <a:t>을 이용한다</a:t>
+            </a:r>
+            <a:r>
+              <a:rPr lang="en-US" altLang="ko-KR" sz="1500" dirty="0"/>
+              <a:t>.</a:t>
+            </a:r>
+            <a:endParaRPr lang="ko-KR" altLang="en-US" sz="1500" dirty="0"/>
+          </a:p>
+        </p:txBody>
+      </p:sp>
+    </p:spTree>
+    <p:extLst>
+      <p:ext uri="{BB962C8B-B14F-4D97-AF65-F5344CB8AC3E}">
+        <p14:creationId xmlns:p14="http://schemas.microsoft.com/office/powerpoint/2010/main" val="1463731395"/>
+      </p:ext>
+    </p:extLst>
+  </p:cSld>
+  <p:clrMapOvr>
+    <a:masterClrMapping/>
+  </p:clrMapOvr>
+</p:sld>
+</file>
+
+<file path=ppt/slides/slide21.xml><?xml version="1.0" encoding="utf-8"?>
+<p:sld xmlns:a="http://schemas.openxmlformats.org/drawingml/2006/main" xmlns:r="http://schemas.openxmlformats.org/officeDocument/2006/relationships" xmlns:p="http://schemas.openxmlformats.org/presentationml/2006/main">
+  <p:cSld>
+    <p:spTree>
+      <p:nvGrpSpPr>
+        <p:cNvPr id="1" name=""/>
+        <p:cNvGrpSpPr/>
+        <p:nvPr/>
+      </p:nvGrpSpPr>
+      <p:grpSpPr>
+        <a:xfrm>
+          <a:off x="0" y="0"/>
+          <a:ext cx="0" cy="0"/>
+          <a:chOff x="0" y="0"/>
+          <a:chExt cx="0" cy="0"/>
+        </a:xfrm>
+      </p:grpSpPr>
+      <p:sp>
+        <p:nvSpPr>
+          <p:cNvPr id="2" name="제목 1">
+            <a:extLst>
+              <a:ext uri="{FF2B5EF4-FFF2-40B4-BE49-F238E27FC236}">
+                <a16:creationId xmlns:a16="http://schemas.microsoft.com/office/drawing/2014/main" id="{4828AE60-84A1-B989-6120-CBCA71A4BF1F}"/>
+              </a:ext>
+            </a:extLst>
+          </p:cNvPr>
+          <p:cNvSpPr>
+            <a:spLocks noGrp="1"/>
+          </p:cNvSpPr>
+          <p:nvPr>
+            <p:ph type="title"/>
+          </p:nvPr>
+        </p:nvSpPr>
+        <p:spPr/>
+        <p:txBody>
+          <a:bodyPr/>
+          <a:lstStyle/>
+          <a:p>
+            <a:r>
+              <a:rPr lang="ko-KR" altLang="en-US" dirty="0"/>
+              <a:t>빌드와 </a:t>
+            </a:r>
+            <a:r>
+              <a:rPr lang="ko-KR" altLang="en-US" dirty="0" err="1"/>
+              <a:t>베포</a:t>
+            </a:r>
+            <a:endParaRPr lang="ko-KR" altLang="en-US" dirty="0"/>
+          </a:p>
+        </p:txBody>
+      </p:sp>
+      <p:sp>
+        <p:nvSpPr>
+          <p:cNvPr id="3" name="내용 개체 틀 2">
+            <a:extLst>
+              <a:ext uri="{FF2B5EF4-FFF2-40B4-BE49-F238E27FC236}">
+                <a16:creationId xmlns:a16="http://schemas.microsoft.com/office/drawing/2014/main" id="{B21569F9-D25D-F2C0-01E7-F83094C56BD3}"/>
+              </a:ext>
+            </a:extLst>
+          </p:cNvPr>
+          <p:cNvSpPr>
+            <a:spLocks noGrp="1"/>
+          </p:cNvSpPr>
+          <p:nvPr>
+            <p:ph idx="1"/>
+          </p:nvPr>
+        </p:nvSpPr>
+        <p:spPr/>
+        <p:txBody>
+          <a:bodyPr>
+            <a:normAutofit/>
+          </a:bodyPr>
+          <a:lstStyle/>
+          <a:p>
+            <a:r>
+              <a:rPr lang="ko-KR" altLang="en-US" sz="1500" dirty="0"/>
+              <a:t>빌드</a:t>
+            </a:r>
+            <a:r>
+              <a:rPr lang="en-US" altLang="ko-KR" sz="1500" dirty="0"/>
+              <a:t>: </a:t>
+            </a:r>
+            <a:r>
+              <a:rPr lang="ko-KR" altLang="en-US" sz="1500" dirty="0"/>
+              <a:t>소스코드를 </a:t>
+            </a:r>
+            <a:r>
+              <a:rPr lang="en-US" altLang="ko-KR" sz="1500" dirty="0"/>
+              <a:t>dependency</a:t>
+            </a:r>
+            <a:r>
+              <a:rPr lang="ko-KR" altLang="en-US" sz="1500" dirty="0"/>
+              <a:t>와 함께 </a:t>
+            </a:r>
+            <a:r>
+              <a:rPr lang="ko-KR" altLang="en-US" sz="1500" dirty="0" err="1"/>
+              <a:t>베포</a:t>
+            </a:r>
+            <a:r>
+              <a:rPr lang="ko-KR" altLang="en-US" sz="1500" dirty="0"/>
+              <a:t> 가능한 패키지로 컴파일하는 과정</a:t>
+            </a:r>
+            <a:r>
+              <a:rPr lang="en-US" altLang="ko-KR" sz="1500" dirty="0"/>
+              <a:t>. </a:t>
+            </a:r>
+            <a:r>
+              <a:rPr lang="ko-KR" altLang="en-US" sz="1500" dirty="0" err="1"/>
+              <a:t>베포</a:t>
+            </a:r>
+            <a:r>
+              <a:rPr lang="ko-KR" altLang="en-US" sz="1500" dirty="0"/>
+              <a:t> 가능한 패키지는 서버에서 실행될 수 있고</a:t>
+            </a:r>
+            <a:r>
+              <a:rPr lang="en-US" altLang="ko-KR" sz="1500" dirty="0"/>
+              <a:t>, </a:t>
+            </a:r>
+            <a:r>
+              <a:rPr lang="ko-KR" altLang="en-US" sz="1500" dirty="0"/>
+              <a:t>사용자에게 제공될 수 있다</a:t>
+            </a:r>
+            <a:r>
+              <a:rPr lang="en-US" altLang="ko-KR" sz="1500" dirty="0"/>
+              <a:t>.</a:t>
+            </a:r>
+          </a:p>
+          <a:p>
+            <a:r>
+              <a:rPr lang="en-US" altLang="ko-KR" sz="1500" dirty="0"/>
+              <a:t>JSP</a:t>
+            </a:r>
+            <a:r>
+              <a:rPr lang="ko-KR" altLang="en-US" sz="1500" dirty="0"/>
+              <a:t>를 </a:t>
+            </a:r>
+            <a:r>
+              <a:rPr lang="en-US" altLang="ko-KR" sz="1500" dirty="0"/>
+              <a:t>VIEW</a:t>
+            </a:r>
+            <a:r>
+              <a:rPr lang="ko-KR" altLang="en-US" sz="1500" dirty="0"/>
+              <a:t>쪽에 이용하는 </a:t>
+            </a:r>
+            <a:r>
+              <a:rPr lang="en-US" altLang="ko-KR" sz="1500" dirty="0"/>
+              <a:t>Spring </a:t>
+            </a:r>
+            <a:r>
+              <a:rPr lang="ko-KR" altLang="en-US" sz="1500" dirty="0"/>
+              <a:t>프로젝트의 경우</a:t>
+            </a:r>
+            <a:r>
+              <a:rPr lang="en-US" altLang="ko-KR" sz="1500" dirty="0"/>
+              <a:t>, WAR(Web Application Archive)</a:t>
+            </a:r>
+            <a:r>
+              <a:rPr lang="ko-KR" altLang="en-US" sz="1500" dirty="0"/>
+              <a:t>파일을 만드는 과정이다</a:t>
+            </a:r>
+            <a:r>
+              <a:rPr lang="en-US" altLang="ko-KR" sz="1500" dirty="0"/>
+              <a:t>.</a:t>
+            </a:r>
+          </a:p>
+          <a:p>
+            <a:r>
+              <a:rPr lang="en-US" altLang="ko-KR" sz="1500" dirty="0" err="1"/>
+              <a:t>Cmd</a:t>
+            </a:r>
+            <a:r>
+              <a:rPr lang="ko-KR" altLang="en-US" sz="1500" dirty="0"/>
+              <a:t>에서 </a:t>
+            </a:r>
+            <a:r>
+              <a:rPr lang="en-US" altLang="ko-KR" sz="1500" dirty="0"/>
+              <a:t>Pom.xml</a:t>
+            </a:r>
+            <a:r>
+              <a:rPr lang="ko-KR" altLang="en-US" sz="1500" dirty="0"/>
+              <a:t>파일이 있는 </a:t>
+            </a:r>
+            <a:r>
+              <a:rPr lang="en-US" altLang="ko-KR" sz="1500" dirty="0"/>
+              <a:t>directory</a:t>
+            </a:r>
+            <a:r>
+              <a:rPr lang="ko-KR" altLang="en-US" sz="1500" dirty="0"/>
+              <a:t>로 이동 후</a:t>
+            </a:r>
+            <a:r>
+              <a:rPr lang="en-US" altLang="ko-KR" sz="1500" dirty="0"/>
+              <a:t>, </a:t>
+            </a:r>
+            <a:r>
+              <a:rPr lang="en-US" altLang="ko-KR" sz="1500" dirty="0" err="1"/>
+              <a:t>mvn</a:t>
+            </a:r>
+            <a:r>
+              <a:rPr lang="en-US" altLang="ko-KR" sz="1500" dirty="0"/>
+              <a:t> clean package</a:t>
+            </a:r>
+            <a:r>
+              <a:rPr lang="ko-KR" altLang="en-US" sz="1500" dirty="0"/>
+              <a:t>를 실행한다</a:t>
+            </a:r>
+            <a:r>
+              <a:rPr lang="en-US" altLang="ko-KR" sz="1500" dirty="0"/>
+              <a:t>.</a:t>
+            </a:r>
+          </a:p>
+          <a:p>
+            <a:r>
+              <a:rPr lang="en-US" altLang="ko-KR" sz="1500" dirty="0"/>
+              <a:t>Maven</a:t>
+            </a:r>
+            <a:r>
+              <a:rPr lang="ko-KR" altLang="en-US" sz="1500" dirty="0"/>
+              <a:t>이 코드 컴파일</a:t>
+            </a:r>
+            <a:r>
+              <a:rPr lang="en-US" altLang="ko-KR" sz="1500" dirty="0"/>
+              <a:t>, </a:t>
+            </a:r>
+            <a:r>
+              <a:rPr lang="ko-KR" altLang="en-US" sz="1500" dirty="0"/>
+              <a:t>테스트 런</a:t>
+            </a:r>
+            <a:r>
+              <a:rPr lang="en-US" altLang="ko-KR" sz="1500" dirty="0"/>
+              <a:t>, WAR </a:t>
+            </a:r>
+            <a:r>
+              <a:rPr lang="ko-KR" altLang="en-US" sz="1500" dirty="0"/>
+              <a:t>파일을 만드는 과정을 수행한다</a:t>
+            </a:r>
+            <a:r>
+              <a:rPr lang="en-US" altLang="ko-KR" sz="1500" dirty="0"/>
+              <a:t>.</a:t>
+            </a:r>
+          </a:p>
+          <a:p>
+            <a:r>
+              <a:rPr lang="ko-KR" altLang="en-US" sz="1500" dirty="0"/>
+              <a:t>만들어진 </a:t>
+            </a:r>
+            <a:r>
+              <a:rPr lang="en-US" altLang="ko-KR" sz="1500" dirty="0"/>
+              <a:t>WAR </a:t>
+            </a:r>
+            <a:r>
+              <a:rPr lang="ko-KR" altLang="en-US" sz="1500" dirty="0"/>
+              <a:t>파일은 </a:t>
+            </a:r>
+            <a:r>
+              <a:rPr lang="en-US" altLang="ko-KR" sz="1500" dirty="0"/>
+              <a:t>target </a:t>
+            </a:r>
+            <a:r>
+              <a:rPr lang="ko-KR" altLang="en-US" sz="1500" dirty="0"/>
+              <a:t>디렉토리에 위치한다</a:t>
+            </a:r>
+            <a:r>
+              <a:rPr lang="en-US" altLang="ko-KR" sz="1500" dirty="0"/>
+              <a:t>.</a:t>
+            </a:r>
+          </a:p>
+          <a:p>
+            <a:r>
+              <a:rPr lang="ko-KR" altLang="en-US" sz="1500" dirty="0"/>
+              <a:t>만들어진 </a:t>
+            </a:r>
+            <a:r>
+              <a:rPr lang="en-US" altLang="ko-KR" sz="1500" dirty="0"/>
+              <a:t>WAR</a:t>
+            </a:r>
+            <a:r>
+              <a:rPr lang="ko-KR" altLang="en-US" sz="1500" dirty="0"/>
+              <a:t>파일을 복사해서</a:t>
+            </a:r>
+            <a:r>
+              <a:rPr lang="en-US" altLang="ko-KR" sz="1500" dirty="0"/>
+              <a:t>, Tomcat(</a:t>
+            </a:r>
+            <a:r>
+              <a:rPr lang="ko-KR" altLang="en-US" sz="1500" dirty="0" err="1"/>
+              <a:t>서블릿</a:t>
+            </a:r>
+            <a:r>
+              <a:rPr lang="ko-KR" altLang="en-US" sz="1500" dirty="0"/>
+              <a:t> 컨테이너</a:t>
+            </a:r>
+            <a:r>
+              <a:rPr lang="en-US" altLang="ko-KR" sz="1500" dirty="0"/>
+              <a:t>)</a:t>
+            </a:r>
+            <a:r>
+              <a:rPr lang="ko-KR" altLang="en-US" sz="1500" dirty="0"/>
+              <a:t>의 </a:t>
+            </a:r>
+            <a:r>
+              <a:rPr lang="en-US" altLang="ko-KR" sz="1500" dirty="0"/>
+              <a:t>root directory</a:t>
+            </a:r>
+            <a:r>
+              <a:rPr lang="ko-KR" altLang="en-US" sz="1500" dirty="0"/>
+              <a:t>의 </a:t>
+            </a:r>
+            <a:r>
+              <a:rPr lang="en-US" altLang="ko-KR" sz="1500" dirty="0"/>
+              <a:t>webapps </a:t>
+            </a:r>
+            <a:r>
+              <a:rPr lang="ko-KR" altLang="en-US" sz="1500" dirty="0"/>
+              <a:t>디렉토리에 위치시킨다</a:t>
+            </a:r>
+            <a:r>
+              <a:rPr lang="en-US" altLang="ko-KR" sz="1500" dirty="0"/>
+              <a:t>.</a:t>
+            </a:r>
+          </a:p>
+          <a:p>
+            <a:r>
+              <a:rPr lang="en-US" altLang="ko-KR" sz="1500" dirty="0" err="1"/>
+              <a:t>cmd</a:t>
+            </a:r>
+            <a:r>
+              <a:rPr lang="ko-KR" altLang="en-US" sz="1500" dirty="0"/>
+              <a:t>에서 </a:t>
+            </a:r>
+            <a:r>
+              <a:rPr lang="en-US" altLang="ko-KR" sz="1500" dirty="0"/>
+              <a:t>Tomcat</a:t>
+            </a:r>
+            <a:r>
+              <a:rPr lang="ko-KR" altLang="en-US" sz="1500" dirty="0"/>
+              <a:t>의 </a:t>
+            </a:r>
+            <a:r>
+              <a:rPr lang="en-US" altLang="ko-KR" sz="1500" dirty="0"/>
+              <a:t>root directory</a:t>
+            </a:r>
+            <a:r>
+              <a:rPr lang="ko-KR" altLang="en-US" sz="1500" dirty="0"/>
+              <a:t>의 </a:t>
+            </a:r>
+            <a:r>
+              <a:rPr lang="en-US" altLang="ko-KR" sz="1500" dirty="0"/>
+              <a:t>bin</a:t>
+            </a:r>
+            <a:r>
+              <a:rPr lang="ko-KR" altLang="en-US" sz="1500" dirty="0"/>
+              <a:t>으로 이동 후</a:t>
+            </a:r>
+            <a:r>
+              <a:rPr lang="en-US" altLang="ko-KR" sz="1500" dirty="0"/>
+              <a:t>, startup.bat</a:t>
+            </a:r>
+            <a:r>
+              <a:rPr lang="ko-KR" altLang="en-US" sz="1500" dirty="0"/>
+              <a:t>를 실행한다</a:t>
+            </a:r>
+            <a:r>
+              <a:rPr lang="en-US" altLang="ko-KR" sz="1500" dirty="0"/>
+              <a:t>.</a:t>
+            </a:r>
+          </a:p>
+          <a:p>
+            <a:r>
+              <a:rPr lang="en-US" altLang="ko-KR" sz="1500" dirty="0"/>
+              <a:t>Localhost:8080/</a:t>
+            </a:r>
+            <a:r>
+              <a:rPr lang="en-US" altLang="ko-KR" sz="1500" dirty="0" err="1"/>
+              <a:t>warfile_name</a:t>
+            </a:r>
+            <a:r>
+              <a:rPr lang="en-US" altLang="ko-KR" sz="1500" dirty="0"/>
+              <a:t> </a:t>
+            </a:r>
+            <a:r>
+              <a:rPr lang="en-US" altLang="ko-KR" sz="1500" dirty="0" err="1"/>
+              <a:t>url</a:t>
+            </a:r>
+            <a:r>
+              <a:rPr lang="ko-KR" altLang="en-US" sz="1500" dirty="0"/>
+              <a:t>로 웹 애플리케이션에 접속한다</a:t>
+            </a:r>
+            <a:r>
+              <a:rPr lang="en-US" altLang="ko-KR" sz="1500" dirty="0"/>
+              <a:t>. (http://localhost:8080/study-1.0-SNAPSHOT/posts)</a:t>
+            </a:r>
+          </a:p>
+          <a:p>
+            <a:r>
+              <a:rPr lang="en-US" altLang="ko-KR" sz="1500" dirty="0" err="1"/>
+              <a:t>Cmd</a:t>
+            </a:r>
+            <a:r>
+              <a:rPr lang="ko-KR" altLang="en-US" sz="1500" dirty="0"/>
+              <a:t>에서 </a:t>
+            </a:r>
+            <a:r>
+              <a:rPr lang="en-US" altLang="ko-KR" sz="1500" dirty="0"/>
+              <a:t>shutdown.bat</a:t>
+            </a:r>
+            <a:r>
+              <a:rPr lang="ko-KR" altLang="en-US" sz="1500" dirty="0"/>
+              <a:t>를</a:t>
+            </a:r>
+            <a:r>
+              <a:rPr lang="en-US" altLang="ko-KR" sz="1500" dirty="0"/>
+              <a:t> </a:t>
+            </a:r>
+            <a:r>
+              <a:rPr lang="ko-KR" altLang="en-US" sz="1500" dirty="0"/>
+              <a:t>사용해서 </a:t>
+            </a:r>
+            <a:r>
+              <a:rPr lang="en-US" altLang="ko-KR" sz="1500" dirty="0"/>
+              <a:t>Tomcat</a:t>
+            </a:r>
+            <a:r>
+              <a:rPr lang="ko-KR" altLang="en-US" sz="1500" dirty="0"/>
+              <a:t>을 멈춘다</a:t>
+            </a:r>
+            <a:r>
+              <a:rPr lang="en-US" altLang="ko-KR" sz="1500" dirty="0"/>
+              <a:t>.</a:t>
+            </a:r>
+            <a:endParaRPr lang="ko-KR" altLang="en-US" sz="1500" dirty="0"/>
+          </a:p>
+        </p:txBody>
+      </p:sp>
+    </p:spTree>
+    <p:extLst>
+      <p:ext uri="{BB962C8B-B14F-4D97-AF65-F5344CB8AC3E}">
+        <p14:creationId xmlns:p14="http://schemas.microsoft.com/office/powerpoint/2010/main" val="818961356"/>
+      </p:ext>
+    </p:extLst>
+  </p:cSld>
+  <p:clrMapOvr>
+    <a:masterClrMapping/>
+  </p:clrMapOvr>
+</p:sld>
+</file>
+
 <file path=ppt/slides/slide3.xml><?xml version="1.0" encoding="utf-8"?>
 <p:sld xmlns:a="http://schemas.openxmlformats.org/drawingml/2006/main" xmlns:r="http://schemas.openxmlformats.org/officeDocument/2006/relationships" xmlns:p="http://schemas.openxmlformats.org/presentationml/2006/main">
   <p:cSld>
@@ -7848,15 +9129,116 @@
             <p:ph idx="1"/>
           </p:nvPr>
         </p:nvSpPr>
-        <p:spPr/>
+        <p:spPr>
+          <a:xfrm>
+            <a:off x="838200" y="2312537"/>
+            <a:ext cx="10515600" cy="3864425"/>
+          </a:xfrm>
+        </p:spPr>
         <p:txBody>
-          <a:bodyPr/>
+          <a:bodyPr>
+            <a:normAutofit/>
+          </a:bodyPr>
           <a:lstStyle/>
           <a:p>
-            <a:endParaRPr lang="ko-KR" altLang="en-US" dirty="0"/>
+            <a:r>
+              <a:rPr lang="ko-KR" altLang="en-US" sz="1500" dirty="0"/>
+              <a:t>해당 </a:t>
+            </a:r>
+            <a:r>
+              <a:rPr lang="en-US" altLang="ko-KR" sz="1500" dirty="0"/>
+              <a:t>post</a:t>
+            </a:r>
+            <a:r>
+              <a:rPr lang="ko-KR" altLang="en-US" sz="1500" dirty="0"/>
+              <a:t>와 관련된 </a:t>
+            </a:r>
+            <a:r>
+              <a:rPr lang="en-US" altLang="ko-KR" sz="1500" dirty="0"/>
+              <a:t>comment</a:t>
+            </a:r>
+            <a:r>
+              <a:rPr lang="ko-KR" altLang="en-US" sz="1500" dirty="0"/>
+              <a:t>를 모두 가져와서 </a:t>
+            </a:r>
+            <a:r>
+              <a:rPr lang="en-US" altLang="ko-KR" sz="1500" dirty="0" err="1"/>
+              <a:t>allComments</a:t>
+            </a:r>
+            <a:r>
+              <a:rPr lang="en-US" altLang="ko-KR" sz="1500" dirty="0"/>
+              <a:t> </a:t>
+            </a:r>
+            <a:r>
+              <a:rPr lang="ko-KR" altLang="en-US" sz="1500" dirty="0"/>
+              <a:t>참조변수로 받는다</a:t>
+            </a:r>
+            <a:r>
+              <a:rPr lang="en-US" altLang="ko-KR" sz="1500" dirty="0"/>
+              <a:t>.</a:t>
+            </a:r>
+          </a:p>
+          <a:p>
+            <a:r>
+              <a:rPr lang="en-US" altLang="ko-KR" sz="1500" dirty="0" err="1"/>
+              <a:t>allComments</a:t>
+            </a:r>
+            <a:r>
+              <a:rPr lang="en-US" altLang="ko-KR" sz="1500" dirty="0"/>
+              <a:t> </a:t>
+            </a:r>
+            <a:r>
+              <a:rPr lang="ko-KR" altLang="en-US" sz="1500" dirty="0"/>
+              <a:t>값을 </a:t>
+            </a:r>
+            <a:r>
+              <a:rPr lang="en-US" altLang="ko-KR" sz="1500" dirty="0" err="1"/>
+              <a:t>buildCommentHierachy</a:t>
+            </a:r>
+            <a:r>
+              <a:rPr lang="ko-KR" altLang="en-US" sz="1500" dirty="0"/>
+              <a:t>메소드에 넣어준 결과값을 반환한다</a:t>
+            </a:r>
+            <a:r>
+              <a:rPr lang="en-US" altLang="ko-KR" sz="1500" dirty="0"/>
+              <a:t>.</a:t>
+            </a:r>
+          </a:p>
+          <a:p>
+            <a:endParaRPr lang="ko-KR" altLang="en-US" sz="1500" dirty="0"/>
           </a:p>
         </p:txBody>
       </p:sp>
+      <p:pic>
+        <p:nvPicPr>
+          <p:cNvPr id="5" name="그림 4">
+            <a:extLst>
+              <a:ext uri="{FF2B5EF4-FFF2-40B4-BE49-F238E27FC236}">
+                <a16:creationId xmlns:a16="http://schemas.microsoft.com/office/drawing/2014/main" id="{8FE6D9BE-7A8D-5A8D-DBA9-CD74694F0237}"/>
+              </a:ext>
+            </a:extLst>
+          </p:cNvPr>
+          <p:cNvPicPr>
+            <a:picLocks noChangeAspect="1"/>
+          </p:cNvPicPr>
+          <p:nvPr/>
+        </p:nvPicPr>
+        <p:blipFill>
+          <a:blip r:embed="rId2"/>
+          <a:stretch>
+            <a:fillRect/>
+          </a:stretch>
+        </p:blipFill>
+        <p:spPr>
+          <a:xfrm>
+            <a:off x="527214" y="1416843"/>
+            <a:ext cx="5359236" cy="895694"/>
+          </a:xfrm>
+          <a:prstGeom prst="rect">
+            <a:avLst/>
+          </a:prstGeom>
+        </p:spPr>
+      </p:pic>
     </p:spTree>
     <p:extLst>
       <p:ext uri="{BB962C8B-B14F-4D97-AF65-F5344CB8AC3E}">
@@ -7871,6 +9253,594 @@
 </file>
 
 <file path=ppt/slides/slide7.xml><?xml version="1.0" encoding="utf-8"?>
+<p:sld xmlns:a="http://schemas.openxmlformats.org/drawingml/2006/main" xmlns:r="http://schemas.openxmlformats.org/officeDocument/2006/relationships" xmlns:p="http://schemas.openxmlformats.org/presentationml/2006/main">
+  <p:cSld>
+    <p:spTree>
+      <p:nvGrpSpPr>
+        <p:cNvPr id="1" name=""/>
+        <p:cNvGrpSpPr/>
+        <p:nvPr/>
+      </p:nvGrpSpPr>
+      <p:grpSpPr>
+        <a:xfrm>
+          <a:off x="0" y="0"/>
+          <a:ext cx="0" cy="0"/>
+          <a:chOff x="0" y="0"/>
+          <a:chExt cx="0" cy="0"/>
+        </a:xfrm>
+      </p:grpSpPr>
+      <p:sp>
+        <p:nvSpPr>
+          <p:cNvPr id="2" name="제목 1">
+            <a:extLst>
+              <a:ext uri="{FF2B5EF4-FFF2-40B4-BE49-F238E27FC236}">
+                <a16:creationId xmlns:a16="http://schemas.microsoft.com/office/drawing/2014/main" id="{10C2D82F-1D4D-5976-A767-F2B2E929FC6F}"/>
+              </a:ext>
+            </a:extLst>
+          </p:cNvPr>
+          <p:cNvSpPr>
+            <a:spLocks noGrp="1"/>
+          </p:cNvSpPr>
+          <p:nvPr>
+            <p:ph type="title"/>
+          </p:nvPr>
+        </p:nvSpPr>
+        <p:spPr/>
+        <p:txBody>
+          <a:bodyPr/>
+          <a:lstStyle/>
+          <a:p>
+            <a:r>
+              <a:rPr lang="en-US" altLang="ko-KR" dirty="0"/>
+              <a:t>Service</a:t>
+            </a:r>
+            <a:endParaRPr lang="ko-KR" altLang="en-US" dirty="0"/>
+          </a:p>
+        </p:txBody>
+      </p:sp>
+      <p:sp>
+        <p:nvSpPr>
+          <p:cNvPr id="3" name="내용 개체 틀 2">
+            <a:extLst>
+              <a:ext uri="{FF2B5EF4-FFF2-40B4-BE49-F238E27FC236}">
+                <a16:creationId xmlns:a16="http://schemas.microsoft.com/office/drawing/2014/main" id="{3817037E-FA89-1362-A4E8-FE095DE42B39}"/>
+              </a:ext>
+            </a:extLst>
+          </p:cNvPr>
+          <p:cNvSpPr>
+            <a:spLocks noGrp="1"/>
+          </p:cNvSpPr>
+          <p:nvPr>
+            <p:ph idx="1"/>
+          </p:nvPr>
+        </p:nvSpPr>
+        <p:spPr>
+          <a:xfrm>
+            <a:off x="5467546" y="1825625"/>
+            <a:ext cx="5886254" cy="4351338"/>
+          </a:xfrm>
+        </p:spPr>
+        <p:txBody>
+          <a:bodyPr>
+            <a:normAutofit/>
+          </a:bodyPr>
+          <a:lstStyle/>
+          <a:p>
+            <a:r>
+              <a:rPr lang="ko-KR" altLang="en-US" sz="1500" dirty="0"/>
+              <a:t>처음에 </a:t>
+            </a:r>
+            <a:r>
+              <a:rPr lang="en-US" altLang="ko-KR" sz="1500" dirty="0"/>
+              <a:t>HashMap&lt;Long, Comment&gt; </a:t>
+            </a:r>
+            <a:r>
+              <a:rPr lang="en-US" altLang="ko-KR" sz="1500" dirty="0" err="1"/>
+              <a:t>commentMap</a:t>
+            </a:r>
+            <a:r>
+              <a:rPr lang="ko-KR" altLang="en-US" sz="1500" dirty="0"/>
+              <a:t>과 </a:t>
+            </a:r>
+            <a:r>
+              <a:rPr lang="en-US" altLang="ko-KR" sz="1500" dirty="0"/>
+              <a:t>List&lt;Comment&gt; </a:t>
+            </a:r>
+            <a:r>
+              <a:rPr lang="en-US" altLang="ko-KR" sz="1500" dirty="0" err="1"/>
+              <a:t>rootComments</a:t>
+            </a:r>
+            <a:r>
+              <a:rPr lang="en-US" altLang="ko-KR" sz="1500" dirty="0"/>
+              <a:t> </a:t>
+            </a:r>
+            <a:r>
+              <a:rPr lang="ko-KR" altLang="en-US" sz="1500" dirty="0"/>
+              <a:t>참조변수 생성</a:t>
+            </a:r>
+            <a:endParaRPr lang="en-US" altLang="ko-KR" sz="1500" dirty="0"/>
+          </a:p>
+          <a:p>
+            <a:r>
+              <a:rPr lang="ko-KR" altLang="en-US" sz="1500" dirty="0" err="1"/>
+              <a:t>첫번재</a:t>
+            </a:r>
+            <a:r>
+              <a:rPr lang="ko-KR" altLang="en-US" sz="1500" dirty="0"/>
+              <a:t> </a:t>
+            </a:r>
+            <a:r>
+              <a:rPr lang="en-US" altLang="ko-KR" sz="1500" dirty="0"/>
+              <a:t>loop: </a:t>
+            </a:r>
+            <a:r>
+              <a:rPr lang="ko-KR" altLang="en-US" sz="1500" dirty="0"/>
+              <a:t>모든</a:t>
+            </a:r>
+            <a:r>
+              <a:rPr lang="en-US" altLang="ko-KR" sz="1500" dirty="0"/>
+              <a:t> comment</a:t>
+            </a:r>
+            <a:r>
+              <a:rPr lang="ko-KR" altLang="en-US" sz="1500" dirty="0"/>
+              <a:t>를 </a:t>
+            </a:r>
+            <a:r>
+              <a:rPr lang="en-US" altLang="ko-KR" sz="1500" dirty="0"/>
+              <a:t>loop</a:t>
+            </a:r>
+            <a:r>
+              <a:rPr lang="ko-KR" altLang="en-US" sz="1500" dirty="0"/>
+              <a:t>를 돌면서</a:t>
+            </a:r>
+            <a:r>
+              <a:rPr lang="en-US" altLang="ko-KR" sz="1500" dirty="0"/>
+              <a:t>, </a:t>
+            </a:r>
+            <a:r>
+              <a:rPr lang="en-US" altLang="ko-KR" sz="1500" dirty="0" err="1"/>
+              <a:t>commentId</a:t>
+            </a:r>
+            <a:r>
+              <a:rPr lang="ko-KR" altLang="en-US" sz="1500" dirty="0"/>
+              <a:t>를 </a:t>
+            </a:r>
+            <a:r>
+              <a:rPr lang="en-US" altLang="ko-KR" sz="1500" dirty="0"/>
+              <a:t>key</a:t>
+            </a:r>
+            <a:r>
+              <a:rPr lang="ko-KR" altLang="en-US" sz="1500" dirty="0"/>
+              <a:t>로 해서 </a:t>
+            </a:r>
+            <a:r>
+              <a:rPr lang="en-US" altLang="ko-KR" sz="1500" dirty="0"/>
+              <a:t>HashMap</a:t>
+            </a:r>
+            <a:r>
+              <a:rPr lang="ko-KR" altLang="en-US" sz="1500" dirty="0"/>
+              <a:t>에 채워주고</a:t>
+            </a:r>
+            <a:r>
+              <a:rPr lang="en-US" altLang="ko-KR" sz="1500" dirty="0"/>
+              <a:t>, </a:t>
+            </a:r>
+            <a:r>
+              <a:rPr lang="en-US" altLang="ko-KR" sz="1500" dirty="0" err="1"/>
+              <a:t>parentCommentId</a:t>
+            </a:r>
+            <a:r>
+              <a:rPr lang="ko-KR" altLang="en-US" sz="1500" dirty="0"/>
+              <a:t>가 없는 경우</a:t>
+            </a:r>
+            <a:r>
+              <a:rPr lang="en-US" altLang="ko-KR" sz="1500" dirty="0"/>
+              <a:t>, </a:t>
+            </a:r>
+            <a:r>
+              <a:rPr lang="en-US" altLang="ko-KR" sz="1500" dirty="0" err="1"/>
+              <a:t>rootComments</a:t>
+            </a:r>
+            <a:r>
+              <a:rPr lang="en-US" altLang="ko-KR" sz="1500" dirty="0"/>
+              <a:t> </a:t>
+            </a:r>
+            <a:r>
+              <a:rPr lang="en-US" altLang="ko-KR" sz="1500" dirty="0" err="1"/>
+              <a:t>ArrayList</a:t>
+            </a:r>
+            <a:r>
+              <a:rPr lang="ko-KR" altLang="en-US" sz="1500" dirty="0"/>
+              <a:t>에 해당 </a:t>
+            </a:r>
+            <a:r>
+              <a:rPr lang="en-US" altLang="ko-KR" sz="1500" dirty="0"/>
+              <a:t>comment</a:t>
+            </a:r>
+            <a:r>
+              <a:rPr lang="ko-KR" altLang="en-US" sz="1500" dirty="0"/>
+              <a:t> 객체를 넣어준다</a:t>
+            </a:r>
+            <a:r>
+              <a:rPr lang="en-US" altLang="ko-KR" sz="1500" dirty="0"/>
+              <a:t>.</a:t>
+            </a:r>
+          </a:p>
+          <a:p>
+            <a:r>
+              <a:rPr lang="ko-KR" altLang="en-US" sz="1500" dirty="0"/>
+              <a:t>두번째 </a:t>
+            </a:r>
+            <a:r>
+              <a:rPr lang="en-US" altLang="ko-KR" sz="1500" dirty="0"/>
+              <a:t>loop: </a:t>
+            </a:r>
+            <a:r>
+              <a:rPr lang="ko-KR" altLang="en-US" sz="1500" dirty="0"/>
+              <a:t>모든 </a:t>
+            </a:r>
+            <a:r>
+              <a:rPr lang="en-US" altLang="ko-KR" sz="1500" dirty="0"/>
+              <a:t>comment</a:t>
+            </a:r>
+            <a:r>
+              <a:rPr lang="ko-KR" altLang="en-US" sz="1500" dirty="0"/>
+              <a:t>를 </a:t>
+            </a:r>
+            <a:r>
+              <a:rPr lang="en-US" altLang="ko-KR" sz="1500" dirty="0"/>
+              <a:t>loop</a:t>
+            </a:r>
+            <a:r>
+              <a:rPr lang="ko-KR" altLang="en-US" sz="1500" dirty="0"/>
+              <a:t>를 돌면서</a:t>
+            </a:r>
+            <a:r>
+              <a:rPr lang="en-US" altLang="ko-KR" sz="1500" dirty="0"/>
+              <a:t>, </a:t>
+            </a:r>
+            <a:r>
+              <a:rPr lang="ko-KR" altLang="en-US" sz="1500" dirty="0"/>
+              <a:t>처음에 </a:t>
+            </a:r>
+            <a:r>
+              <a:rPr lang="en-US" altLang="ko-KR" sz="1500" dirty="0" err="1"/>
+              <a:t>ParentCommentId</a:t>
+            </a:r>
+            <a:r>
+              <a:rPr lang="ko-KR" altLang="en-US" sz="1500" dirty="0"/>
+              <a:t> 프로퍼티 값이 </a:t>
+            </a:r>
+            <a:r>
+              <a:rPr lang="en-US" altLang="ko-KR" sz="1500" dirty="0"/>
+              <a:t>null</a:t>
+            </a:r>
+            <a:r>
+              <a:rPr lang="ko-KR" altLang="en-US" sz="1500" dirty="0"/>
+              <a:t>이 아닌지 확인한다</a:t>
+            </a:r>
+            <a:r>
+              <a:rPr lang="en-US" altLang="ko-KR" sz="1500" dirty="0"/>
+              <a:t>. </a:t>
+            </a:r>
+            <a:r>
+              <a:rPr lang="ko-KR" altLang="en-US" sz="1500" dirty="0"/>
+              <a:t>값이 있으면</a:t>
+            </a:r>
+            <a:r>
+              <a:rPr lang="en-US" altLang="ko-KR" sz="1500" dirty="0"/>
+              <a:t>, </a:t>
+            </a:r>
+            <a:r>
+              <a:rPr lang="en-US" altLang="ko-KR" sz="1500" dirty="0" err="1"/>
+              <a:t>parentComment</a:t>
+            </a:r>
+            <a:r>
+              <a:rPr lang="en-US" altLang="ko-KR" sz="1500" dirty="0"/>
+              <a:t> </a:t>
+            </a:r>
+            <a:r>
+              <a:rPr lang="ko-KR" altLang="en-US" sz="1500" dirty="0"/>
+              <a:t>참조변수로 해당 </a:t>
+            </a:r>
+            <a:r>
+              <a:rPr lang="en-US" altLang="ko-KR" sz="1500" dirty="0"/>
+              <a:t>comment</a:t>
+            </a:r>
+            <a:r>
+              <a:rPr lang="ko-KR" altLang="en-US" sz="1500" dirty="0"/>
+              <a:t>의 </a:t>
+            </a:r>
+            <a:r>
+              <a:rPr lang="en-US" altLang="ko-KR" sz="1500" dirty="0" err="1"/>
+              <a:t>parentComment</a:t>
+            </a:r>
+            <a:r>
+              <a:rPr lang="ko-KR" altLang="en-US" sz="1500" dirty="0"/>
+              <a:t>를 가리킨다</a:t>
+            </a:r>
+            <a:r>
+              <a:rPr lang="en-US" altLang="ko-KR" sz="1500" dirty="0"/>
+              <a:t>. </a:t>
+            </a:r>
+            <a:r>
+              <a:rPr lang="ko-KR" altLang="en-US" sz="1500" dirty="0"/>
+              <a:t>그 다음</a:t>
+            </a:r>
+            <a:r>
+              <a:rPr lang="en-US" altLang="ko-KR" sz="1500" dirty="0"/>
+              <a:t>, </a:t>
+            </a:r>
+            <a:r>
+              <a:rPr lang="en-US" altLang="ko-KR" sz="1500" dirty="0" err="1"/>
+              <a:t>parentComment</a:t>
+            </a:r>
+            <a:r>
+              <a:rPr lang="ko-KR" altLang="en-US" sz="1500" dirty="0"/>
+              <a:t>가 </a:t>
+            </a:r>
+            <a:r>
+              <a:rPr lang="en-US" altLang="ko-KR" sz="1500" dirty="0"/>
+              <a:t>null</a:t>
+            </a:r>
+            <a:r>
+              <a:rPr lang="ko-KR" altLang="en-US" sz="1500" dirty="0"/>
+              <a:t>이 아니고</a:t>
+            </a:r>
+            <a:r>
+              <a:rPr lang="en-US" altLang="ko-KR" sz="1500" dirty="0"/>
+              <a:t>, </a:t>
+            </a:r>
+            <a:r>
+              <a:rPr lang="en-US" altLang="ko-KR" sz="1500" dirty="0" err="1"/>
+              <a:t>parentComment</a:t>
+            </a:r>
+            <a:r>
+              <a:rPr lang="ko-KR" altLang="en-US" sz="1500" dirty="0"/>
+              <a:t>가 </a:t>
+            </a:r>
+            <a:r>
+              <a:rPr lang="en-US" altLang="ko-KR" sz="1500" dirty="0" err="1"/>
+              <a:t>childComment</a:t>
+            </a:r>
+            <a:r>
+              <a:rPr lang="en-US" altLang="ko-KR" sz="1500" dirty="0"/>
+              <a:t>(list&lt;comment&gt;)</a:t>
+            </a:r>
+            <a:r>
+              <a:rPr lang="ko-KR" altLang="en-US" sz="1500" dirty="0"/>
+              <a:t>를 가지고 있지 않으면</a:t>
+            </a:r>
+            <a:r>
+              <a:rPr lang="en-US" altLang="ko-KR" sz="1500" dirty="0"/>
+              <a:t>, </a:t>
+            </a:r>
+            <a:r>
+              <a:rPr lang="ko-KR" altLang="en-US" sz="1500" dirty="0"/>
+              <a:t>새로운 </a:t>
+            </a:r>
+            <a:r>
+              <a:rPr lang="en-US" altLang="ko-KR" sz="1500" dirty="0" err="1"/>
+              <a:t>ArrayList</a:t>
+            </a:r>
+            <a:r>
+              <a:rPr lang="ko-KR" altLang="en-US" sz="1500" dirty="0"/>
+              <a:t>를 생성해서</a:t>
+            </a:r>
+            <a:r>
+              <a:rPr lang="en-US" altLang="ko-KR" sz="1500" dirty="0"/>
+              <a:t>, </a:t>
+            </a:r>
+            <a:r>
+              <a:rPr lang="en-US" altLang="ko-KR" sz="1500" dirty="0" err="1"/>
+              <a:t>parentComment</a:t>
+            </a:r>
+            <a:r>
+              <a:rPr lang="ko-KR" altLang="en-US" sz="1500" dirty="0"/>
+              <a:t>의 프로퍼티인 </a:t>
+            </a:r>
+            <a:r>
+              <a:rPr lang="en-US" altLang="ko-KR" sz="1500" dirty="0" err="1"/>
+              <a:t>childComments</a:t>
+            </a:r>
+            <a:r>
+              <a:rPr lang="ko-KR" altLang="en-US" sz="1500" dirty="0"/>
+              <a:t>를 </a:t>
+            </a:r>
+            <a:r>
+              <a:rPr lang="en-US" altLang="ko-KR" sz="1500" dirty="0"/>
+              <a:t>set</a:t>
+            </a:r>
+            <a:r>
+              <a:rPr lang="ko-KR" altLang="en-US" sz="1500" dirty="0"/>
+              <a:t>한다</a:t>
+            </a:r>
+            <a:r>
+              <a:rPr lang="en-US" altLang="ko-KR" sz="1500" dirty="0"/>
+              <a:t>. </a:t>
+            </a:r>
+            <a:r>
+              <a:rPr lang="ko-KR" altLang="en-US" sz="1500" dirty="0"/>
+              <a:t>그리고</a:t>
+            </a:r>
+            <a:r>
+              <a:rPr lang="en-US" altLang="ko-KR" sz="1500" dirty="0"/>
+              <a:t>, </a:t>
+            </a:r>
+            <a:r>
+              <a:rPr lang="en-US" altLang="ko-KR" sz="1500" dirty="0" err="1"/>
+              <a:t>parentComment</a:t>
+            </a:r>
+            <a:r>
+              <a:rPr lang="ko-KR" altLang="en-US" sz="1500" dirty="0"/>
+              <a:t>의 </a:t>
+            </a:r>
+            <a:r>
+              <a:rPr lang="en-US" altLang="ko-KR" sz="1500" dirty="0" err="1"/>
+              <a:t>childComments</a:t>
+            </a:r>
+            <a:r>
+              <a:rPr lang="en-US" altLang="ko-KR" sz="1500" dirty="0"/>
+              <a:t> </a:t>
+            </a:r>
+            <a:r>
+              <a:rPr lang="ko-KR" altLang="en-US" sz="1500" dirty="0"/>
+              <a:t>프로퍼티를 </a:t>
+            </a:r>
+            <a:r>
+              <a:rPr lang="en-US" altLang="ko-KR" sz="1500" dirty="0"/>
+              <a:t>get</a:t>
+            </a:r>
+            <a:r>
+              <a:rPr lang="ko-KR" altLang="en-US" sz="1500" dirty="0"/>
+              <a:t>해서</a:t>
+            </a:r>
+            <a:r>
+              <a:rPr lang="en-US" altLang="ko-KR" sz="1500" dirty="0"/>
+              <a:t>, </a:t>
+            </a:r>
+            <a:r>
+              <a:rPr lang="ko-KR" altLang="en-US" sz="1500" dirty="0"/>
+              <a:t>해당 </a:t>
+            </a:r>
+            <a:r>
+              <a:rPr lang="en-US" altLang="ko-KR" sz="1500" dirty="0" err="1"/>
+              <a:t>ArrayList</a:t>
+            </a:r>
+            <a:r>
+              <a:rPr lang="ko-KR" altLang="en-US" sz="1500" dirty="0"/>
+              <a:t>에 해당 </a:t>
+            </a:r>
+            <a:r>
+              <a:rPr lang="en-US" altLang="ko-KR" sz="1500" dirty="0"/>
+              <a:t>loop</a:t>
+            </a:r>
+            <a:r>
+              <a:rPr lang="ko-KR" altLang="en-US" sz="1500" dirty="0"/>
+              <a:t>의 </a:t>
+            </a:r>
+            <a:r>
+              <a:rPr lang="en-US" altLang="ko-KR" sz="1500" dirty="0"/>
+              <a:t>comment</a:t>
+            </a:r>
+            <a:r>
+              <a:rPr lang="ko-KR" altLang="en-US" sz="1500" dirty="0"/>
+              <a:t>를 추가한다</a:t>
+            </a:r>
+            <a:r>
+              <a:rPr lang="en-US" altLang="ko-KR" sz="1500" dirty="0"/>
+              <a:t>.</a:t>
+            </a:r>
+          </a:p>
+          <a:p>
+            <a:r>
+              <a:rPr lang="ko-KR" altLang="en-US" sz="1500" dirty="0"/>
+              <a:t>이 과정을 통해</a:t>
+            </a:r>
+            <a:r>
+              <a:rPr lang="en-US" altLang="ko-KR" sz="1500" dirty="0"/>
+              <a:t>, parent child </a:t>
+            </a:r>
+            <a:r>
+              <a:rPr lang="ko-KR" altLang="en-US" sz="1500" dirty="0"/>
+              <a:t>관계의 </a:t>
+            </a:r>
+            <a:r>
+              <a:rPr lang="en-US" altLang="ko-KR" sz="1500" dirty="0"/>
+              <a:t>comment</a:t>
+            </a:r>
+            <a:r>
+              <a:rPr lang="ko-KR" altLang="en-US" sz="1500" dirty="0"/>
+              <a:t>들의 계층 구조를 만든 뒤</a:t>
+            </a:r>
+            <a:r>
+              <a:rPr lang="en-US" altLang="ko-KR" sz="1500" dirty="0"/>
+              <a:t>, </a:t>
+            </a:r>
+            <a:r>
+              <a:rPr lang="en-US" altLang="ko-KR" sz="1500" dirty="0" err="1"/>
+              <a:t>parentCommentId</a:t>
+            </a:r>
+            <a:r>
+              <a:rPr lang="ko-KR" altLang="en-US" sz="1500" dirty="0"/>
+              <a:t>가 없는 제일 기반이 되는 </a:t>
+            </a:r>
+            <a:r>
+              <a:rPr lang="en-US" altLang="ko-KR" sz="1500" dirty="0"/>
+              <a:t>comment</a:t>
+            </a:r>
+            <a:r>
+              <a:rPr lang="ko-KR" altLang="en-US" sz="1500" dirty="0"/>
+              <a:t>의 </a:t>
+            </a:r>
+            <a:r>
+              <a:rPr lang="en-US" altLang="ko-KR" sz="1500" dirty="0"/>
+              <a:t>List(</a:t>
+            </a:r>
+            <a:r>
+              <a:rPr lang="en-US" altLang="ko-KR" sz="1500" dirty="0" err="1"/>
+              <a:t>rootComments</a:t>
+            </a:r>
+            <a:r>
+              <a:rPr lang="en-US" altLang="ko-KR" sz="1500" dirty="0"/>
+              <a:t>)</a:t>
+            </a:r>
+            <a:r>
+              <a:rPr lang="ko-KR" altLang="en-US" sz="1500" dirty="0"/>
+              <a:t>를 반환한다</a:t>
+            </a:r>
+            <a:r>
+              <a:rPr lang="en-US" altLang="ko-KR" sz="1500" dirty="0"/>
+              <a:t>.</a:t>
+            </a:r>
+            <a:endParaRPr lang="ko-KR" altLang="en-US" sz="1500" dirty="0"/>
+          </a:p>
+        </p:txBody>
+      </p:sp>
+      <p:pic>
+        <p:nvPicPr>
+          <p:cNvPr id="7" name="그림 6">
+            <a:extLst>
+              <a:ext uri="{FF2B5EF4-FFF2-40B4-BE49-F238E27FC236}">
+                <a16:creationId xmlns:a16="http://schemas.microsoft.com/office/drawing/2014/main" id="{0F2F8A36-BC1D-3FC9-B43D-4299DA76BD57}"/>
+              </a:ext>
+            </a:extLst>
+          </p:cNvPr>
+          <p:cNvPicPr>
+            <a:picLocks noChangeAspect="1"/>
+          </p:cNvPicPr>
+          <p:nvPr/>
+        </p:nvPicPr>
+        <p:blipFill>
+          <a:blip r:embed="rId2"/>
+          <a:stretch>
+            <a:fillRect/>
+          </a:stretch>
+        </p:blipFill>
+        <p:spPr>
+          <a:xfrm>
+            <a:off x="261447" y="1864689"/>
+            <a:ext cx="5073978" cy="3659811"/>
+          </a:xfrm>
+          <a:prstGeom prst="rect">
+            <a:avLst/>
+          </a:prstGeom>
+        </p:spPr>
+      </p:pic>
+    </p:spTree>
+    <p:extLst>
+      <p:ext uri="{BB962C8B-B14F-4D97-AF65-F5344CB8AC3E}">
+        <p14:creationId xmlns:p14="http://schemas.microsoft.com/office/powerpoint/2010/main" val="3569301987"/>
+      </p:ext>
+    </p:extLst>
+  </p:cSld>
+  <p:clrMapOvr>
+    <a:masterClrMapping/>
+  </p:clrMapOvr>
+</p:sld>
+</file>
+
+<file path=ppt/slides/slide8.xml><?xml version="1.0" encoding="utf-8"?>
 <p:sld xmlns:a="http://schemas.openxmlformats.org/drawingml/2006/main" xmlns:r="http://schemas.openxmlformats.org/officeDocument/2006/relationships" xmlns:p="http://schemas.openxmlformats.org/presentationml/2006/main">
   <p:cSld>
     <p:spTree>
@@ -8387,7 +10357,7 @@
 </p:sld>
 </file>
 
-<file path=ppt/slides/slide8.xml><?xml version="1.0" encoding="utf-8"?>
+<file path=ppt/slides/slide9.xml><?xml version="1.0" encoding="utf-8"?>
 <p:sld xmlns:a="http://schemas.openxmlformats.org/drawingml/2006/main" xmlns:r="http://schemas.openxmlformats.org/officeDocument/2006/relationships" xmlns:p="http://schemas.openxmlformats.org/presentationml/2006/main">
   <p:cSld>
     <p:spTree>
@@ -8733,431 +10703,6 @@
     <p:extLst>
       <p:ext uri="{BB962C8B-B14F-4D97-AF65-F5344CB8AC3E}">
         <p14:creationId xmlns:p14="http://schemas.microsoft.com/office/powerpoint/2010/main" val="3384401235"/>
-      </p:ext>
-    </p:extLst>
-  </p:cSld>
-  <p:clrMapOvr>
-    <a:masterClrMapping/>
-  </p:clrMapOvr>
-</p:sld>
-</file>
-
-<file path=ppt/slides/slide9.xml><?xml version="1.0" encoding="utf-8"?>
-<p:sld xmlns:a="http://schemas.openxmlformats.org/drawingml/2006/main" xmlns:r="http://schemas.openxmlformats.org/officeDocument/2006/relationships" xmlns:p="http://schemas.openxmlformats.org/presentationml/2006/main">
-  <p:cSld>
-    <p:spTree>
-      <p:nvGrpSpPr>
-        <p:cNvPr id="1" name=""/>
-        <p:cNvGrpSpPr/>
-        <p:nvPr/>
-      </p:nvGrpSpPr>
-      <p:grpSpPr>
-        <a:xfrm>
-          <a:off x="0" y="0"/>
-          <a:ext cx="0" cy="0"/>
-          <a:chOff x="0" y="0"/>
-          <a:chExt cx="0" cy="0"/>
-        </a:xfrm>
-      </p:grpSpPr>
-      <p:sp>
-        <p:nvSpPr>
-          <p:cNvPr id="2" name="제목 1">
-            <a:extLst>
-              <a:ext uri="{FF2B5EF4-FFF2-40B4-BE49-F238E27FC236}">
-                <a16:creationId xmlns:a16="http://schemas.microsoft.com/office/drawing/2014/main" id="{C7A70ABB-1CBE-FBBF-E74C-E3DBD3EE4EB6}"/>
-              </a:ext>
-            </a:extLst>
-          </p:cNvPr>
-          <p:cNvSpPr>
-            <a:spLocks noGrp="1"/>
-          </p:cNvSpPr>
-          <p:nvPr>
-            <p:ph type="title"/>
-          </p:nvPr>
-        </p:nvSpPr>
-        <p:spPr/>
-        <p:txBody>
-          <a:bodyPr/>
-          <a:lstStyle/>
-          <a:p>
-            <a:r>
-              <a:rPr lang="en-US" altLang="ko-KR" sz="3000" dirty="0"/>
-              <a:t>Controller</a:t>
-            </a:r>
-            <a:r>
-              <a:rPr lang="en-US" altLang="ko-KR" sz="2000" dirty="0"/>
-              <a:t>(</a:t>
-            </a:r>
-            <a:r>
-              <a:rPr lang="en-US" altLang="ko-KR" sz="2000" dirty="0" err="1"/>
-              <a:t>UserController</a:t>
-            </a:r>
-            <a:r>
-              <a:rPr lang="en-US" altLang="ko-KR" sz="2000" dirty="0"/>
-              <a:t>)</a:t>
-            </a:r>
-            <a:endParaRPr lang="ko-KR" altLang="en-US" sz="2000" dirty="0"/>
-          </a:p>
-        </p:txBody>
-      </p:sp>
-      <p:sp>
-        <p:nvSpPr>
-          <p:cNvPr id="3" name="내용 개체 틀 2">
-            <a:extLst>
-              <a:ext uri="{FF2B5EF4-FFF2-40B4-BE49-F238E27FC236}">
-                <a16:creationId xmlns:a16="http://schemas.microsoft.com/office/drawing/2014/main" id="{DEA9CDA8-0219-529B-A333-4B9479A92801}"/>
-              </a:ext>
-            </a:extLst>
-          </p:cNvPr>
-          <p:cNvSpPr>
-            <a:spLocks noGrp="1"/>
-          </p:cNvSpPr>
-          <p:nvPr>
-            <p:ph idx="1"/>
-          </p:nvPr>
-        </p:nvSpPr>
-        <p:spPr>
-          <a:xfrm>
-            <a:off x="838200" y="3525625"/>
-            <a:ext cx="10515600" cy="2651338"/>
-          </a:xfrm>
-        </p:spPr>
-        <p:txBody>
-          <a:bodyPr>
-            <a:normAutofit/>
-          </a:bodyPr>
-          <a:lstStyle/>
-          <a:p>
-            <a:r>
-              <a:rPr lang="en-US" altLang="ko-KR" sz="2000" dirty="0" err="1"/>
-              <a:t>PostMapping</a:t>
-            </a:r>
-            <a:endParaRPr lang="en-US" altLang="ko-KR" sz="2000" dirty="0"/>
-          </a:p>
-          <a:p>
-            <a:pPr marL="0" indent="0">
-              <a:buNone/>
-            </a:pPr>
-            <a:r>
-              <a:rPr lang="en-US" altLang="ko-KR" sz="1500" dirty="0" err="1"/>
-              <a:t>changePassword.jsp</a:t>
-            </a:r>
-            <a:r>
-              <a:rPr lang="ko-KR" altLang="en-US" sz="1500" dirty="0"/>
-              <a:t> 화면에서 사용자의 </a:t>
-            </a:r>
-            <a:r>
-              <a:rPr lang="en-US" altLang="ko-KR" sz="1500" dirty="0"/>
-              <a:t>Post </a:t>
-            </a:r>
-            <a:r>
-              <a:rPr lang="ko-KR" altLang="en-US" sz="1500" dirty="0"/>
-              <a:t>요청을 </a:t>
-            </a:r>
-            <a:r>
-              <a:rPr lang="en-US" altLang="ko-KR" sz="1500" dirty="0" err="1"/>
-              <a:t>changePassword</a:t>
-            </a:r>
-            <a:r>
-              <a:rPr lang="en-US" altLang="ko-KR" sz="1500" dirty="0"/>
-              <a:t> </a:t>
-            </a:r>
-            <a:r>
-              <a:rPr lang="ko-KR" altLang="en-US" sz="1500" dirty="0"/>
-              <a:t>메소드로 </a:t>
-            </a:r>
-            <a:r>
-              <a:rPr lang="ko-KR" altLang="en-US" sz="1500" dirty="0" err="1"/>
-              <a:t>매핑시킨다</a:t>
-            </a:r>
-            <a:r>
-              <a:rPr lang="en-US" altLang="ko-KR" sz="1500" dirty="0"/>
-              <a:t>.</a:t>
-            </a:r>
-          </a:p>
-          <a:p>
-            <a:pPr marL="0" indent="0">
-              <a:buNone/>
-            </a:pPr>
-            <a:r>
-              <a:rPr lang="en-US" altLang="ko-KR" sz="1500" dirty="0"/>
-              <a:t>@RequestParam: Request Body</a:t>
-            </a:r>
-            <a:r>
-              <a:rPr lang="ko-KR" altLang="en-US" sz="1500" dirty="0"/>
-              <a:t>에 있는 데이터를 </a:t>
-            </a:r>
-            <a:r>
-              <a:rPr lang="en-US" altLang="ko-KR" sz="1500" dirty="0"/>
-              <a:t>key</a:t>
-            </a:r>
-            <a:r>
-              <a:rPr lang="ko-KR" altLang="en-US" sz="1500" dirty="0"/>
-              <a:t>값을 통해서 받아들인다</a:t>
-            </a:r>
-            <a:r>
-              <a:rPr lang="en-US" altLang="ko-KR" sz="1500" dirty="0"/>
-              <a:t>.</a:t>
-            </a:r>
-            <a:endParaRPr lang="en-US" altLang="ko-KR" sz="2000" dirty="0"/>
-          </a:p>
-          <a:p>
-            <a:pPr marL="0" indent="0">
-              <a:buNone/>
-            </a:pPr>
-            <a:r>
-              <a:rPr lang="en-US" altLang="ko-KR" sz="1500" dirty="0" err="1"/>
-              <a:t>userService</a:t>
-            </a:r>
-            <a:r>
-              <a:rPr lang="ko-KR" altLang="en-US" sz="1500" dirty="0"/>
-              <a:t>의 </a:t>
-            </a:r>
-            <a:r>
-              <a:rPr lang="en-US" altLang="ko-KR" sz="1500" dirty="0" err="1"/>
-              <a:t>changePassword</a:t>
-            </a:r>
-            <a:r>
-              <a:rPr lang="ko-KR" altLang="en-US" sz="1500" dirty="0"/>
-              <a:t>메소드를 수행하고</a:t>
-            </a:r>
-            <a:r>
-              <a:rPr lang="en-US" altLang="ko-KR" sz="1500" dirty="0"/>
-              <a:t>, </a:t>
-            </a:r>
-            <a:r>
-              <a:rPr lang="en-US" altLang="ko-KR" sz="1500" dirty="0" err="1"/>
-              <a:t>boolean</a:t>
-            </a:r>
-            <a:r>
-              <a:rPr lang="en-US" altLang="ko-KR" sz="1500" dirty="0"/>
-              <a:t> </a:t>
-            </a:r>
-            <a:r>
-              <a:rPr lang="ko-KR" altLang="en-US" sz="1500" dirty="0"/>
-              <a:t>형태의 </a:t>
-            </a:r>
-            <a:r>
-              <a:rPr lang="en-US" altLang="ko-KR" sz="1500" dirty="0"/>
-              <a:t>return</a:t>
-            </a:r>
-            <a:r>
-              <a:rPr lang="ko-KR" altLang="en-US" sz="1500" dirty="0"/>
-              <a:t>값을 </a:t>
-            </a:r>
-            <a:r>
-              <a:rPr lang="en-US" altLang="ko-KR" sz="1500" dirty="0"/>
-              <a:t>changed</a:t>
-            </a:r>
-            <a:r>
-              <a:rPr lang="ko-KR" altLang="en-US" sz="1500" dirty="0"/>
-              <a:t>에 저장한다</a:t>
-            </a:r>
-            <a:r>
-              <a:rPr lang="en-US" altLang="ko-KR" sz="1500" dirty="0"/>
-              <a:t>.</a:t>
-            </a:r>
-          </a:p>
-          <a:p>
-            <a:pPr marL="0" indent="0">
-              <a:buNone/>
-            </a:pPr>
-            <a:r>
-              <a:rPr lang="ko-KR" altLang="en-US" sz="1500" dirty="0"/>
-              <a:t>만약</a:t>
-            </a:r>
-            <a:r>
-              <a:rPr lang="en-US" altLang="ko-KR" sz="1500" dirty="0"/>
-              <a:t>, Password</a:t>
-            </a:r>
-            <a:r>
-              <a:rPr lang="ko-KR" altLang="en-US" sz="1500" dirty="0"/>
-              <a:t>가 </a:t>
-            </a:r>
-            <a:r>
-              <a:rPr lang="ko-KR" altLang="en-US" sz="1500" dirty="0" err="1"/>
-              <a:t>변경됬으면</a:t>
-            </a:r>
-            <a:r>
-              <a:rPr lang="en-US" altLang="ko-KR" sz="1500" dirty="0"/>
-              <a:t>, user/login </a:t>
-            </a:r>
-            <a:r>
-              <a:rPr lang="en-US" altLang="ko-KR" sz="1500" dirty="0" err="1"/>
-              <a:t>url</a:t>
-            </a:r>
-            <a:r>
-              <a:rPr lang="ko-KR" altLang="en-US" sz="1500" dirty="0"/>
-              <a:t>로 </a:t>
-            </a:r>
-            <a:r>
-              <a:rPr lang="en-US" altLang="ko-KR" sz="1500" dirty="0"/>
-              <a:t>get </a:t>
-            </a:r>
-            <a:r>
-              <a:rPr lang="ko-KR" altLang="en-US" sz="1500" dirty="0"/>
-              <a:t>요청을 보낸다</a:t>
-            </a:r>
-            <a:r>
-              <a:rPr lang="en-US" altLang="ko-KR" sz="1500" dirty="0"/>
-              <a:t>. </a:t>
-            </a:r>
-            <a:r>
-              <a:rPr lang="ko-KR" altLang="en-US" sz="1500" dirty="0"/>
-              <a:t>그러면 앞에서 본 </a:t>
-            </a:r>
-            <a:r>
-              <a:rPr lang="en-US" altLang="ko-KR" sz="1500" dirty="0" err="1"/>
-              <a:t>url</a:t>
-            </a:r>
-            <a:r>
-              <a:rPr lang="ko-KR" altLang="en-US" sz="1500" dirty="0"/>
-              <a:t>에 </a:t>
-            </a:r>
-            <a:r>
-              <a:rPr lang="ko-KR" altLang="en-US" sz="1500" dirty="0" err="1"/>
-              <a:t>매핑된</a:t>
-            </a:r>
-            <a:r>
-              <a:rPr lang="ko-KR" altLang="en-US" sz="1500" dirty="0"/>
-              <a:t> 메소드가 실행되고</a:t>
-            </a:r>
-            <a:r>
-              <a:rPr lang="en-US" altLang="ko-KR" sz="1500" dirty="0"/>
-              <a:t>, </a:t>
-            </a:r>
-            <a:r>
-              <a:rPr lang="en-US" altLang="ko-KR" sz="1500" dirty="0" err="1"/>
-              <a:t>login.jsp</a:t>
-            </a:r>
-            <a:r>
-              <a:rPr lang="ko-KR" altLang="en-US" sz="1500" dirty="0"/>
-              <a:t>가 사용자에게 보여지게 된다</a:t>
-            </a:r>
-            <a:r>
-              <a:rPr lang="en-US" altLang="ko-KR" sz="1500" dirty="0"/>
-              <a:t>.</a:t>
-            </a:r>
-          </a:p>
-          <a:p>
-            <a:pPr marL="0" indent="0">
-              <a:buNone/>
-            </a:pPr>
-            <a:r>
-              <a:rPr lang="en-US" altLang="ko-KR" sz="1500" dirty="0"/>
-              <a:t>Model: </a:t>
-            </a:r>
-            <a:r>
-              <a:rPr lang="ko-KR" altLang="en-US" sz="1500" dirty="0"/>
-              <a:t>모델은 데이터를 </a:t>
-            </a:r>
-            <a:r>
-              <a:rPr lang="en-US" altLang="ko-KR" sz="1500" dirty="0"/>
-              <a:t>view</a:t>
-            </a:r>
-            <a:r>
-              <a:rPr lang="ko-KR" altLang="en-US" sz="1500" dirty="0"/>
-              <a:t>로 보내는 것을 허용한다</a:t>
-            </a:r>
-            <a:r>
-              <a:rPr lang="en-US" altLang="ko-KR" sz="1500" dirty="0"/>
-              <a:t>. (</a:t>
-            </a:r>
-            <a:r>
-              <a:rPr lang="ko-KR" altLang="en-US" sz="1500" dirty="0"/>
-              <a:t>여기서는 </a:t>
-            </a:r>
-            <a:r>
-              <a:rPr lang="en-US" altLang="ko-KR" sz="1500" dirty="0"/>
-              <a:t>model</a:t>
-            </a:r>
-            <a:r>
-              <a:rPr lang="ko-KR" altLang="en-US" sz="1500" dirty="0"/>
-              <a:t>에 </a:t>
-            </a:r>
-            <a:r>
-              <a:rPr lang="en-US" altLang="ko-KR" sz="1500" dirty="0"/>
-              <a:t>key “error”, value “</a:t>
-            </a:r>
-            <a:r>
-              <a:rPr lang="ko-KR" altLang="en-US" sz="1500" dirty="0"/>
-              <a:t>패스워드를 바꾸는데 실패했습니다</a:t>
-            </a:r>
-            <a:r>
-              <a:rPr lang="en-US" altLang="ko-KR" sz="1500" dirty="0"/>
-              <a:t>.”</a:t>
-            </a:r>
-            <a:r>
-              <a:rPr lang="ko-KR" altLang="en-US" sz="1500" dirty="0"/>
-              <a:t>를 등록하고 이 데이터를 </a:t>
-            </a:r>
-            <a:r>
-              <a:rPr lang="en-US" altLang="ko-KR" sz="1500" dirty="0" err="1"/>
-              <a:t>changePassword.jsp</a:t>
-            </a:r>
-            <a:r>
-              <a:rPr lang="ko-KR" altLang="en-US" sz="1500" dirty="0"/>
-              <a:t>로 보낸다</a:t>
-            </a:r>
-            <a:r>
-              <a:rPr lang="en-US" altLang="ko-KR" sz="1500" dirty="0"/>
-              <a:t>.)</a:t>
-            </a:r>
-          </a:p>
-          <a:p>
-            <a:pPr marL="0" indent="0">
-              <a:buNone/>
-            </a:pPr>
-            <a:endParaRPr lang="en-US" altLang="ko-KR" sz="1500" dirty="0"/>
-          </a:p>
-          <a:p>
-            <a:pPr marL="0" indent="0">
-              <a:buNone/>
-            </a:pPr>
-            <a:endParaRPr lang="en-US" altLang="ko-KR" sz="1500" dirty="0"/>
-          </a:p>
-          <a:p>
-            <a:pPr marL="0" indent="0">
-              <a:buNone/>
-            </a:pPr>
-            <a:endParaRPr lang="en-US" altLang="ko-KR" sz="1500" dirty="0"/>
-          </a:p>
-        </p:txBody>
-      </p:sp>
-      <p:pic>
-        <p:nvPicPr>
-          <p:cNvPr id="9" name="그림 8">
-            <a:extLst>
-              <a:ext uri="{FF2B5EF4-FFF2-40B4-BE49-F238E27FC236}">
-                <a16:creationId xmlns:a16="http://schemas.microsoft.com/office/drawing/2014/main" id="{E2FCED0D-B818-8784-48B7-BA465D42A6FB}"/>
-              </a:ext>
-            </a:extLst>
-          </p:cNvPr>
-          <p:cNvPicPr>
-            <a:picLocks noChangeAspect="1"/>
-          </p:cNvPicPr>
-          <p:nvPr/>
-        </p:nvPicPr>
-        <p:blipFill>
-          <a:blip r:embed="rId2"/>
-          <a:stretch>
-            <a:fillRect/>
-          </a:stretch>
-        </p:blipFill>
-        <p:spPr>
-          <a:xfrm>
-            <a:off x="668518" y="1258675"/>
-            <a:ext cx="8029575" cy="2266950"/>
-          </a:xfrm>
-          <a:prstGeom prst="rect">
-            <a:avLst/>
-          </a:prstGeom>
-        </p:spPr>
-      </p:pic>
-    </p:spTree>
-    <p:extLst>
-      <p:ext uri="{BB962C8B-B14F-4D97-AF65-F5344CB8AC3E}">
-        <p14:creationId xmlns:p14="http://schemas.microsoft.com/office/powerpoint/2010/main" val="2502994158"/>
       </p:ext>
     </p:extLst>
   </p:cSld>

</xml_diff>